<commit_message>
modules 2 & 3
</commit_message>
<xml_diff>
--- a/morea/materials/02-7BasicProgrammingConcepts.pptx
+++ b/morea/materials/02-7BasicProgrammingConcepts.pptx
@@ -5,7 +5,7 @@
     <p:sldMasterId id="2147483648" r:id="rId1"/>
   </p:sldMasterIdLst>
   <p:notesMasterIdLst>
-    <p:notesMasterId r:id="rId21"/>
+    <p:notesMasterId r:id="rId22"/>
   </p:notesMasterIdLst>
   <p:sldIdLst>
     <p:sldId id="256" r:id="rId2"/>
@@ -14,19 +14,20 @@
     <p:sldId id="273" r:id="rId5"/>
     <p:sldId id="274" r:id="rId6"/>
     <p:sldId id="266" r:id="rId7"/>
-    <p:sldId id="270" r:id="rId8"/>
-    <p:sldId id="267" r:id="rId9"/>
-    <p:sldId id="268" r:id="rId10"/>
+    <p:sldId id="289" r:id="rId8"/>
+    <p:sldId id="288" r:id="rId9"/>
+    <p:sldId id="270" r:id="rId10"/>
     <p:sldId id="271" r:id="rId11"/>
-    <p:sldId id="279" r:id="rId12"/>
-    <p:sldId id="287" r:id="rId13"/>
-    <p:sldId id="263" r:id="rId14"/>
-    <p:sldId id="281" r:id="rId15"/>
-    <p:sldId id="282" r:id="rId16"/>
-    <p:sldId id="283" r:id="rId17"/>
-    <p:sldId id="284" r:id="rId18"/>
-    <p:sldId id="285" r:id="rId19"/>
-    <p:sldId id="286" r:id="rId20"/>
+    <p:sldId id="268" r:id="rId12"/>
+    <p:sldId id="279" r:id="rId13"/>
+    <p:sldId id="287" r:id="rId14"/>
+    <p:sldId id="263" r:id="rId15"/>
+    <p:sldId id="281" r:id="rId16"/>
+    <p:sldId id="282" r:id="rId17"/>
+    <p:sldId id="283" r:id="rId18"/>
+    <p:sldId id="284" r:id="rId19"/>
+    <p:sldId id="285" r:id="rId20"/>
+    <p:sldId id="286" r:id="rId21"/>
   </p:sldIdLst>
   <p:sldSz cx="9144000" cy="6858000" type="screen4x3"/>
   <p:notesSz cx="6858000" cy="9144000"/>
@@ -210,7 +211,7 @@
           <a:p>
             <a:fld id="{BB6BAE91-212C-F34F-A74B-874A8C7A7F45}" type="datetimeFigureOut">
               <a:rPr lang="en-US" smtClean="0"/>
-              <a:t>1/24/15</a:t>
+              <a:t>1/27/15</a:t>
             </a:fld>
             <a:endParaRPr lang="en-US"/>
           </a:p>
@@ -639,7 +640,7 @@
           <a:p>
             <a:fld id="{69646EDC-1F5F-A24A-8FE9-6BAE40A63EAE}" type="slidenum">
               <a:rPr lang="en-US" smtClean="0"/>
-              <a:t>17</a:t>
+              <a:t>18</a:t>
             </a:fld>
             <a:endParaRPr lang="en-US"/>
           </a:p>
@@ -727,7 +728,7 @@
           <a:p>
             <a:fld id="{69646EDC-1F5F-A24A-8FE9-6BAE40A63EAE}" type="slidenum">
               <a:rPr lang="en-US" smtClean="0"/>
-              <a:t>19</a:t>
+              <a:t>20</a:t>
             </a:fld>
             <a:endParaRPr lang="en-US"/>
           </a:p>
@@ -938,7 +939,7 @@
           <a:p>
             <a:fld id="{69646EDC-1F5F-A24A-8FE9-6BAE40A63EAE}" type="slidenum">
               <a:rPr lang="en-US" smtClean="0"/>
-              <a:t>7</a:t>
+              <a:t>9</a:t>
             </a:fld>
             <a:endParaRPr lang="en-US"/>
           </a:p>
@@ -1040,7 +1041,7 @@
           <a:p>
             <a:fld id="{69646EDC-1F5F-A24A-8FE9-6BAE40A63EAE}" type="slidenum">
               <a:rPr lang="en-US" smtClean="0"/>
-              <a:t>9</a:t>
+              <a:t>11</a:t>
             </a:fld>
             <a:endParaRPr lang="en-US"/>
           </a:p>
@@ -1124,7 +1125,7 @@
           <a:p>
             <a:fld id="{69646EDC-1F5F-A24A-8FE9-6BAE40A63EAE}" type="slidenum">
               <a:rPr lang="en-US" smtClean="0"/>
-              <a:t>11</a:t>
+              <a:t>12</a:t>
             </a:fld>
             <a:endParaRPr lang="en-US"/>
           </a:p>
@@ -1208,7 +1209,7 @@
           <a:p>
             <a:fld id="{69646EDC-1F5F-A24A-8FE9-6BAE40A63EAE}" type="slidenum">
               <a:rPr lang="en-US" smtClean="0"/>
-              <a:t>12</a:t>
+              <a:t>13</a:t>
             </a:fld>
             <a:endParaRPr lang="en-US"/>
           </a:p>
@@ -1300,7 +1301,7 @@
           <a:p>
             <a:fld id="{69646EDC-1F5F-A24A-8FE9-6BAE40A63EAE}" type="slidenum">
               <a:rPr lang="en-US" smtClean="0"/>
-              <a:t>13</a:t>
+              <a:t>14</a:t>
             </a:fld>
             <a:endParaRPr lang="en-US"/>
           </a:p>
@@ -1408,7 +1409,7 @@
           <a:p>
             <a:fld id="{69646EDC-1F5F-A24A-8FE9-6BAE40A63EAE}" type="slidenum">
               <a:rPr lang="en-US" smtClean="0"/>
-              <a:t>14</a:t>
+              <a:t>15</a:t>
             </a:fld>
             <a:endParaRPr lang="en-US"/>
           </a:p>
@@ -1492,7 +1493,7 @@
           <a:p>
             <a:fld id="{69646EDC-1F5F-A24A-8FE9-6BAE40A63EAE}" type="slidenum">
               <a:rPr lang="en-US" smtClean="0"/>
-              <a:t>15</a:t>
+              <a:t>16</a:t>
             </a:fld>
             <a:endParaRPr lang="en-US"/>
           </a:p>
@@ -1692,7 +1693,7 @@
           <a:p>
             <a:fld id="{95D0A52A-683A-E348-B00D-319C34B8C99A}" type="datetimeFigureOut">
               <a:rPr lang="en-US" smtClean="0"/>
-              <a:t>1/24/15</a:t>
+              <a:t>1/27/15</a:t>
             </a:fld>
             <a:endParaRPr lang="en-US"/>
           </a:p>
@@ -1862,7 +1863,7 @@
           <a:p>
             <a:fld id="{95D0A52A-683A-E348-B00D-319C34B8C99A}" type="datetimeFigureOut">
               <a:rPr lang="en-US" smtClean="0"/>
-              <a:t>1/24/15</a:t>
+              <a:t>1/27/15</a:t>
             </a:fld>
             <a:endParaRPr lang="en-US"/>
           </a:p>
@@ -2042,7 +2043,7 @@
           <a:p>
             <a:fld id="{95D0A52A-683A-E348-B00D-319C34B8C99A}" type="datetimeFigureOut">
               <a:rPr lang="en-US" smtClean="0"/>
-              <a:t>1/24/15</a:t>
+              <a:t>1/27/15</a:t>
             </a:fld>
             <a:endParaRPr lang="en-US"/>
           </a:p>
@@ -2212,7 +2213,7 @@
           <a:p>
             <a:fld id="{95D0A52A-683A-E348-B00D-319C34B8C99A}" type="datetimeFigureOut">
               <a:rPr lang="en-US" smtClean="0"/>
-              <a:t>1/24/15</a:t>
+              <a:t>1/27/15</a:t>
             </a:fld>
             <a:endParaRPr lang="en-US"/>
           </a:p>
@@ -2458,7 +2459,7 @@
           <a:p>
             <a:fld id="{95D0A52A-683A-E348-B00D-319C34B8C99A}" type="datetimeFigureOut">
               <a:rPr lang="en-US" smtClean="0"/>
-              <a:t>1/24/15</a:t>
+              <a:t>1/27/15</a:t>
             </a:fld>
             <a:endParaRPr lang="en-US"/>
           </a:p>
@@ -2746,7 +2747,7 @@
           <a:p>
             <a:fld id="{95D0A52A-683A-E348-B00D-319C34B8C99A}" type="datetimeFigureOut">
               <a:rPr lang="en-US" smtClean="0"/>
-              <a:t>1/24/15</a:t>
+              <a:t>1/27/15</a:t>
             </a:fld>
             <a:endParaRPr lang="en-US"/>
           </a:p>
@@ -3168,7 +3169,7 @@
           <a:p>
             <a:fld id="{95D0A52A-683A-E348-B00D-319C34B8C99A}" type="datetimeFigureOut">
               <a:rPr lang="en-US" smtClean="0"/>
-              <a:t>1/24/15</a:t>
+              <a:t>1/27/15</a:t>
             </a:fld>
             <a:endParaRPr lang="en-US"/>
           </a:p>
@@ -3286,7 +3287,7 @@
           <a:p>
             <a:fld id="{95D0A52A-683A-E348-B00D-319C34B8C99A}" type="datetimeFigureOut">
               <a:rPr lang="en-US" smtClean="0"/>
-              <a:t>1/24/15</a:t>
+              <a:t>1/27/15</a:t>
             </a:fld>
             <a:endParaRPr lang="en-US"/>
           </a:p>
@@ -3381,7 +3382,7 @@
           <a:p>
             <a:fld id="{95D0A52A-683A-E348-B00D-319C34B8C99A}" type="datetimeFigureOut">
               <a:rPr lang="en-US" smtClean="0"/>
-              <a:t>1/24/15</a:t>
+              <a:t>1/27/15</a:t>
             </a:fld>
             <a:endParaRPr lang="en-US"/>
           </a:p>
@@ -3658,7 +3659,7 @@
           <a:p>
             <a:fld id="{95D0A52A-683A-E348-B00D-319C34B8C99A}" type="datetimeFigureOut">
               <a:rPr lang="en-US" smtClean="0"/>
-              <a:t>1/24/15</a:t>
+              <a:t>1/27/15</a:t>
             </a:fld>
             <a:endParaRPr lang="en-US"/>
           </a:p>
@@ -3911,7 +3912,7 @@
           <a:p>
             <a:fld id="{95D0A52A-683A-E348-B00D-319C34B8C99A}" type="datetimeFigureOut">
               <a:rPr lang="en-US" smtClean="0"/>
-              <a:t>1/24/15</a:t>
+              <a:t>1/27/15</a:t>
             </a:fld>
             <a:endParaRPr lang="en-US"/>
           </a:p>
@@ -4124,7 +4125,7 @@
           <a:p>
             <a:fld id="{95D0A52A-683A-E348-B00D-319C34B8C99A}" type="datetimeFigureOut">
               <a:rPr lang="en-US" smtClean="0"/>
-              <a:t>1/24/15</a:t>
+              <a:t>1/27/15</a:t>
             </a:fld>
             <a:endParaRPr lang="en-US"/>
           </a:p>
@@ -4595,9 +4596,395 @@
           </a:p>
         </p:txBody>
       </p:sp>
-      <p:sp>
-        <p:nvSpPr>
-          <p:cNvPr id="4" name="TextBox 4"/>
+    </p:spTree>
+    <p:extLst>
+      <p:ext uri="{BB962C8B-B14F-4D97-AF65-F5344CB8AC3E}">
+        <p14:creationId xmlns:p14="http://schemas.microsoft.com/office/powerpoint/2010/main" val="3501856432"/>
+      </p:ext>
+    </p:extLst>
+  </p:cSld>
+  <p:clrMapOvr>
+    <a:masterClrMapping/>
+  </p:clrMapOvr>
+  <p:timing>
+    <p:tnLst>
+      <p:par>
+        <p:cTn xmlns:p14="http://schemas.microsoft.com/office/powerpoint/2010/main" id="1" dur="indefinite" restart="never" nodeType="tmRoot"/>
+      </p:par>
+    </p:tnLst>
+  </p:timing>
+</p:sld>
+</file>
+
+<file path=ppt/slides/slide10.xml><?xml version="1.0" encoding="utf-8"?>
+<p:sld xmlns:a="http://schemas.openxmlformats.org/drawingml/2006/main" xmlns:r="http://schemas.openxmlformats.org/officeDocument/2006/relationships" xmlns:p="http://schemas.openxmlformats.org/presentationml/2006/main" show="0">
+  <p:cSld>
+    <p:spTree>
+      <p:nvGrpSpPr>
+        <p:cNvPr id="1" name=""/>
+        <p:cNvGrpSpPr/>
+        <p:nvPr/>
+      </p:nvGrpSpPr>
+      <p:grpSpPr>
+        <a:xfrm>
+          <a:off x="0" y="0"/>
+          <a:ext cx="0" cy="0"/>
+          <a:chOff x="0" y="0"/>
+          <a:chExt cx="0" cy="0"/>
+        </a:xfrm>
+      </p:grpSpPr>
+      <p:sp>
+        <p:nvSpPr>
+          <p:cNvPr id="2" name="Title 1"/>
+          <p:cNvSpPr>
+            <a:spLocks noGrp="1"/>
+          </p:cNvSpPr>
+          <p:nvPr>
+            <p:ph type="ctrTitle"/>
+          </p:nvPr>
+        </p:nvSpPr>
+        <p:spPr>
+          <a:xfrm>
+            <a:off x="685800" y="1889125"/>
+            <a:ext cx="7772400" cy="2886075"/>
+          </a:xfrm>
+        </p:spPr>
+        <p:txBody>
+          <a:bodyPr>
+            <a:noAutofit/>
+          </a:bodyPr>
+          <a:lstStyle/>
+          <a:p>
+            <a:r>
+              <a:rPr lang="en-US" sz="3200" dirty="0" smtClean="0"/>
+              <a:t>These 7 concepts can be combined </a:t>
+            </a:r>
+            <a:r>
+              <a:rPr lang="en-US" sz="3200" dirty="0"/>
+              <a:t>in infinitely many </a:t>
+            </a:r>
+            <a:r>
+              <a:rPr lang="en-US" sz="3200" dirty="0" smtClean="0"/>
+              <a:t>ways. </a:t>
+            </a:r>
+            <a:r>
+              <a:rPr lang="en-US" sz="3200" dirty="0"/>
+              <a:t>O</a:t>
+            </a:r>
+            <a:r>
+              <a:rPr lang="en-US" sz="3200" dirty="0" smtClean="0"/>
+              <a:t>nce </a:t>
+            </a:r>
+            <a:r>
+              <a:rPr lang="en-US" sz="3200" dirty="0"/>
+              <a:t>mastered, </a:t>
+            </a:r>
+            <a:r>
+              <a:rPr lang="en-US" sz="3200" dirty="0" smtClean="0"/>
+              <a:t>you can implement </a:t>
+            </a:r>
+            <a:r>
+              <a:rPr lang="en-US" sz="3200" dirty="0"/>
+              <a:t>any program that's ever been written, in any programming </a:t>
+            </a:r>
+            <a:r>
+              <a:rPr lang="en-US" sz="3200" dirty="0" smtClean="0"/>
+              <a:t>language.</a:t>
+            </a:r>
+            <a:endParaRPr lang="en-US" sz="3200" dirty="0"/>
+          </a:p>
+        </p:txBody>
+      </p:sp>
+    </p:spTree>
+    <p:extLst>
+      <p:ext uri="{BB962C8B-B14F-4D97-AF65-F5344CB8AC3E}">
+        <p14:creationId xmlns:p14="http://schemas.microsoft.com/office/powerpoint/2010/main" val="1097651736"/>
+      </p:ext>
+    </p:extLst>
+  </p:cSld>
+  <p:clrMapOvr>
+    <a:masterClrMapping/>
+  </p:clrMapOvr>
+  <mc:AlternateContent xmlns:mc="http://schemas.openxmlformats.org/markup-compatibility/2006">
+    <mc:Choice xmlns:p14="http://schemas.microsoft.com/office/powerpoint/2010/main" Requires="p14">
+      <p:transition spd="slow" p14:dur="2000"/>
+    </mc:Choice>
+    <mc:Fallback>
+      <p:transition xmlns:p14="http://schemas.microsoft.com/office/powerpoint/2010/main" spd="slow"/>
+    </mc:Fallback>
+  </mc:AlternateContent>
+  <p:timing>
+    <p:tnLst>
+      <p:par>
+        <p:cTn xmlns:p14="http://schemas.microsoft.com/office/powerpoint/2010/main" id="1" dur="indefinite" restart="never" nodeType="tmRoot"/>
+      </p:par>
+    </p:tnLst>
+  </p:timing>
+</p:sld>
+</file>
+
+<file path=ppt/slides/slide11.xml><?xml version="1.0" encoding="utf-8"?>
+<p:sld xmlns:a="http://schemas.openxmlformats.org/drawingml/2006/main" xmlns:r="http://schemas.openxmlformats.org/officeDocument/2006/relationships" xmlns:p="http://schemas.openxmlformats.org/presentationml/2006/main" show="0">
+  <p:cSld>
+    <p:spTree>
+      <p:nvGrpSpPr>
+        <p:cNvPr id="1" name=""/>
+        <p:cNvGrpSpPr/>
+        <p:nvPr/>
+      </p:nvGrpSpPr>
+      <p:grpSpPr>
+        <a:xfrm>
+          <a:off x="0" y="0"/>
+          <a:ext cx="0" cy="0"/>
+          <a:chOff x="0" y="0"/>
+          <a:chExt cx="0" cy="0"/>
+        </a:xfrm>
+      </p:grpSpPr>
+      <p:sp>
+        <p:nvSpPr>
+          <p:cNvPr id="37890" name="Title 1"/>
+          <p:cNvSpPr>
+            <a:spLocks noGrp="1"/>
+          </p:cNvSpPr>
+          <p:nvPr>
+            <p:ph type="title"/>
+          </p:nvPr>
+        </p:nvSpPr>
+        <p:spPr/>
+        <p:txBody>
+          <a:bodyPr/>
+          <a:lstStyle/>
+          <a:p>
+            <a:r>
+              <a:rPr lang="en-US" dirty="0">
+                <a:latin typeface="+mn-lt"/>
+                <a:cs typeface="Arial" charset="0"/>
+              </a:rPr>
+              <a:t>Give it a try…</a:t>
+            </a:r>
+          </a:p>
+        </p:txBody>
+      </p:sp>
+      <p:sp>
+        <p:nvSpPr>
+          <p:cNvPr id="35843" name="Content Placeholder 2"/>
+          <p:cNvSpPr>
+            <a:spLocks noGrp="1"/>
+          </p:cNvSpPr>
+          <p:nvPr>
+            <p:ph idx="1"/>
+          </p:nvPr>
+        </p:nvSpPr>
+        <p:spPr>
+          <a:xfrm>
+            <a:off x="228600" y="1295400"/>
+            <a:ext cx="8686800" cy="5105400"/>
+          </a:xfrm>
+        </p:spPr>
+        <p:txBody>
+          <a:bodyPr>
+            <a:normAutofit fontScale="92500" lnSpcReduction="10000"/>
+          </a:bodyPr>
+          <a:lstStyle/>
+          <a:p>
+            <a:pPr>
+              <a:spcAft>
+                <a:spcPts val="1200"/>
+              </a:spcAft>
+            </a:pPr>
+            <a:r>
+              <a:rPr lang="en-US" b="1" dirty="0">
+                <a:cs typeface="Arial" charset="0"/>
+              </a:rPr>
+              <a:t>Problem</a:t>
+            </a:r>
+            <a:r>
+              <a:rPr lang="en-US" dirty="0">
+                <a:cs typeface="Arial" charset="0"/>
+              </a:rPr>
+              <a:t>: sum all the even numbers from 1 to 10</a:t>
+            </a:r>
+          </a:p>
+          <a:p>
+            <a:pPr>
+              <a:spcAft>
+                <a:spcPts val="1200"/>
+              </a:spcAft>
+            </a:pPr>
+            <a:r>
+              <a:rPr lang="en-US" dirty="0">
+                <a:cs typeface="Arial" charset="0"/>
+              </a:rPr>
+              <a:t>Use the </a:t>
+            </a:r>
+            <a:r>
+              <a:rPr lang="en-US" dirty="0" smtClean="0">
+                <a:cs typeface="Arial" charset="0"/>
+              </a:rPr>
+              <a:t>7 </a:t>
+            </a:r>
+            <a:r>
+              <a:rPr lang="en-US" dirty="0">
+                <a:cs typeface="Arial" charset="0"/>
+              </a:rPr>
+              <a:t>principles </a:t>
+            </a:r>
+            <a:r>
+              <a:rPr lang="en-US" dirty="0" smtClean="0">
+                <a:cs typeface="Arial" charset="0"/>
+              </a:rPr>
+              <a:t>to </a:t>
+            </a:r>
+            <a:r>
+              <a:rPr lang="en-US" dirty="0">
+                <a:cs typeface="Arial" charset="0"/>
+              </a:rPr>
+              <a:t>solve</a:t>
+            </a:r>
+          </a:p>
+          <a:p>
+            <a:pPr>
+              <a:spcAft>
+                <a:spcPts val="1200"/>
+              </a:spcAft>
+            </a:pPr>
+            <a:r>
+              <a:rPr lang="en-US" dirty="0">
+                <a:cs typeface="Arial" charset="0"/>
+              </a:rPr>
+              <a:t>Assume the following function is already defined:</a:t>
+            </a:r>
+            <a:br>
+              <a:rPr lang="en-US" dirty="0">
+                <a:cs typeface="Arial" charset="0"/>
+              </a:rPr>
+            </a:br>
+            <a:r>
+              <a:rPr lang="en-US" dirty="0">
+                <a:cs typeface="Arial" charset="0"/>
+              </a:rPr>
+              <a:t>					</a:t>
+            </a:r>
+            <a:r>
+              <a:rPr lang="en-US" dirty="0" smtClean="0">
+                <a:cs typeface="Arial" charset="0"/>
+              </a:rPr>
+              <a:t>					</a:t>
+            </a:r>
+            <a:r>
+              <a:rPr lang="en-US" sz="2400" dirty="0" smtClean="0">
+                <a:cs typeface="Times" charset="0"/>
+              </a:rPr>
+              <a:t>1 </a:t>
+            </a:r>
+            <a:r>
+              <a:rPr lang="en-US" sz="2400" dirty="0">
+                <a:cs typeface="Times" charset="0"/>
+              </a:rPr>
+              <a:t>if </a:t>
+            </a:r>
+            <a:r>
+              <a:rPr lang="en-US" sz="2400" i="1" dirty="0">
+                <a:cs typeface="Times" charset="0"/>
+              </a:rPr>
+              <a:t>x</a:t>
+            </a:r>
+            <a:r>
+              <a:rPr lang="en-US" sz="2400" dirty="0">
+                <a:cs typeface="Times" charset="0"/>
+              </a:rPr>
+              <a:t> is even</a:t>
+            </a:r>
+            <a:br>
+              <a:rPr lang="en-US" sz="2400" dirty="0">
+                <a:cs typeface="Times" charset="0"/>
+              </a:rPr>
+            </a:br>
+            <a:r>
+              <a:rPr lang="en-US" sz="2400" dirty="0">
+                <a:cs typeface="Times" charset="0"/>
+              </a:rPr>
+              <a:t>					</a:t>
+            </a:r>
+            <a:r>
+              <a:rPr lang="en-US" sz="2400" dirty="0" smtClean="0">
+                <a:cs typeface="Times" charset="0"/>
+              </a:rPr>
+              <a:t>					0 </a:t>
+            </a:r>
+            <a:r>
+              <a:rPr lang="en-US" sz="2400" dirty="0">
+                <a:cs typeface="Times" charset="0"/>
+              </a:rPr>
+              <a:t>otherwise</a:t>
+            </a:r>
+          </a:p>
+          <a:p>
+            <a:pPr>
+              <a:spcAft>
+                <a:spcPts val="1200"/>
+              </a:spcAft>
+            </a:pPr>
+            <a:r>
+              <a:rPr lang="en-US" u="sng" dirty="0">
+                <a:cs typeface="Arial" charset="0"/>
+              </a:rPr>
+              <a:t>Hint</a:t>
+            </a:r>
+            <a:r>
+              <a:rPr lang="en-US" dirty="0">
+                <a:cs typeface="Arial" charset="0"/>
+              </a:rPr>
+              <a:t>: you may find it helpful to build your solution </a:t>
+            </a:r>
+            <a:r>
+              <a:rPr lang="en-US" b="1" i="1" dirty="0">
+                <a:cs typeface="Arial" charset="0"/>
+              </a:rPr>
+              <a:t>incrementally</a:t>
+            </a:r>
+            <a:r>
+              <a:rPr lang="en-US" dirty="0">
+                <a:cs typeface="Arial" charset="0"/>
+              </a:rPr>
+              <a:t>:</a:t>
+            </a:r>
+          </a:p>
+          <a:p>
+            <a:pPr lvl="1"/>
+            <a:r>
+              <a:rPr lang="en-US" dirty="0">
+                <a:ea typeface="Arial" charset="0"/>
+                <a:cs typeface="Arial" charset="0"/>
+              </a:rPr>
+              <a:t>Step 1: print out the numbers from 1 to 10</a:t>
+            </a:r>
+          </a:p>
+          <a:p>
+            <a:pPr lvl="1"/>
+            <a:r>
+              <a:rPr lang="en-US" dirty="0">
+                <a:ea typeface="Arial" charset="0"/>
+                <a:cs typeface="Arial" charset="0"/>
+              </a:rPr>
+              <a:t>Step 2: print out the even numbers from 1 to 10</a:t>
+            </a:r>
+          </a:p>
+          <a:p>
+            <a:pPr lvl="1"/>
+            <a:r>
+              <a:rPr lang="en-US" dirty="0">
+                <a:ea typeface="Arial" charset="0"/>
+                <a:cs typeface="Arial" charset="0"/>
+              </a:rPr>
+              <a:t>Step 3: sum the even numbers from 1 to 10</a:t>
+            </a:r>
+          </a:p>
+        </p:txBody>
+      </p:sp>
+      <p:sp>
+        <p:nvSpPr>
+          <p:cNvPr id="35846" name="TextBox 5"/>
           <p:cNvSpPr txBox="1">
             <a:spLocks noChangeArrowheads="1"/>
           </p:cNvSpPr>
@@ -4605,8 +4992,8 @@
         </p:nvSpPr>
         <p:spPr bwMode="auto">
           <a:xfrm>
-            <a:off x="295060" y="264270"/>
-            <a:ext cx="6231060" cy="830997"/>
+            <a:off x="2667000" y="3200400"/>
+            <a:ext cx="1873250" cy="523875"/>
           </a:xfrm>
           <a:prstGeom prst="rect">
             <a:avLst/>
@@ -4636,7 +5023,7 @@
           </a:extLst>
         </p:spPr>
         <p:txBody>
-          <a:bodyPr wrap="square">
+          <a:bodyPr wrap="none">
             <a:spAutoFit/>
           </a:bodyPr>
           <a:lstStyle>
@@ -4749,74 +5136,452 @@
           </a:lstStyle>
           <a:p>
             <a:r>
-              <a:rPr lang="en-US" b="0" i="1" dirty="0">
-                <a:solidFill>
-                  <a:schemeClr val="bg1">
-                    <a:lumMod val="50000"/>
-                  </a:schemeClr>
-                </a:solidFill>
-                <a:latin typeface="+mn-lt"/>
-                <a:cs typeface="Arial" charset="0"/>
-              </a:rPr>
-              <a:t>“Computer Science is no more about computers than astronomy is about telescopes.” </a:t>
-            </a:r>
-            <a:r>
-              <a:rPr lang="en-US" b="0" dirty="0">
-                <a:solidFill>
-                  <a:schemeClr val="bg1">
-                    <a:lumMod val="50000"/>
-                  </a:schemeClr>
-                </a:solidFill>
-                <a:latin typeface="+mn-lt"/>
-                <a:cs typeface="Arial" charset="0"/>
-              </a:rPr>
-              <a:t>-</a:t>
-            </a:r>
-            <a:r>
-              <a:rPr lang="en-US" b="0" dirty="0" err="1">
-                <a:solidFill>
-                  <a:schemeClr val="bg1">
-                    <a:lumMod val="50000"/>
-                  </a:schemeClr>
-                </a:solidFill>
-                <a:latin typeface="+mn-lt"/>
-                <a:cs typeface="Arial" charset="0"/>
-              </a:rPr>
-              <a:t>Dijkstra</a:t>
-            </a:r>
-            <a:endParaRPr lang="en-US" b="0" dirty="0">
-              <a:solidFill>
-                <a:schemeClr val="bg1">
-                  <a:lumMod val="50000"/>
-                </a:schemeClr>
-              </a:solidFill>
-              <a:latin typeface="+mn-lt"/>
-              <a:cs typeface="Arial" charset="0"/>
-            </a:endParaRPr>
+              <a:rPr lang="en-US" sz="2800" b="0" dirty="0" err="1"/>
+              <a:t>isEven</a:t>
+            </a:r>
+            <a:r>
+              <a:rPr lang="en-US" sz="2800" b="0" dirty="0"/>
+              <a:t>(</a:t>
+            </a:r>
+            <a:r>
+              <a:rPr lang="en-US" sz="2800" b="0" i="1" dirty="0"/>
+              <a:t>x</a:t>
+            </a:r>
+            <a:r>
+              <a:rPr lang="en-US" sz="2800" b="0" dirty="0"/>
+              <a:t>) = </a:t>
+            </a:r>
+          </a:p>
+        </p:txBody>
+      </p:sp>
+      <p:sp>
+        <p:nvSpPr>
+          <p:cNvPr id="5" name="Left Brace 4"/>
+          <p:cNvSpPr/>
+          <p:nvPr/>
+        </p:nvSpPr>
+        <p:spPr>
+          <a:xfrm>
+            <a:off x="4572000" y="3124200"/>
+            <a:ext cx="304800" cy="838200"/>
+          </a:xfrm>
+          <a:prstGeom prst="leftBrace">
+            <a:avLst>
+              <a:gd name="adj1" fmla="val 19800"/>
+              <a:gd name="adj2" fmla="val 50000"/>
+            </a:avLst>
+          </a:prstGeom>
+          <a:noFill/>
+          <a:ln>
+            <a:solidFill>
+              <a:schemeClr val="tx1"/>
+            </a:solidFill>
+          </a:ln>
+          <a:effectLst/>
+        </p:spPr>
+        <p:style>
+          <a:lnRef idx="2">
+            <a:schemeClr val="accent1"/>
+          </a:lnRef>
+          <a:fillRef idx="0">
+            <a:schemeClr val="accent1"/>
+          </a:fillRef>
+          <a:effectRef idx="1">
+            <a:schemeClr val="accent1"/>
+          </a:effectRef>
+          <a:fontRef idx="minor">
+            <a:schemeClr val="tx1"/>
+          </a:fontRef>
+        </p:style>
+        <p:txBody>
+          <a:bodyPr anchor="ctr"/>
+          <a:lstStyle/>
+          <a:p>
+            <a:pPr algn="ctr">
+              <a:defRPr/>
+            </a:pPr>
+            <a:endParaRPr lang="en-US"/>
           </a:p>
         </p:txBody>
       </p:sp>
     </p:spTree>
     <p:extLst>
       <p:ext uri="{BB962C8B-B14F-4D97-AF65-F5344CB8AC3E}">
-        <p14:creationId xmlns:p14="http://schemas.microsoft.com/office/powerpoint/2010/main" val="3501856432"/>
+        <p14:creationId xmlns:p14="http://schemas.microsoft.com/office/powerpoint/2010/main" val="4293239312"/>
       </p:ext>
     </p:extLst>
   </p:cSld>
   <p:clrMapOvr>
     <a:masterClrMapping/>
   </p:clrMapOvr>
+  <p:transition xmlns:p14="http://schemas.microsoft.com/office/powerpoint/2010/main" spd="med"/>
   <p:timing>
     <p:tnLst>
       <p:par>
-        <p:cTn xmlns:p14="http://schemas.microsoft.com/office/powerpoint/2010/main" id="1" dur="indefinite" restart="never" nodeType="tmRoot"/>
+        <p:cTn xmlns:p14="http://schemas.microsoft.com/office/powerpoint/2010/main" id="1" dur="indefinite" restart="never" nodeType="tmRoot">
+          <p:childTnLst>
+            <p:seq concurrent="1" nextAc="seek">
+              <p:cTn id="2" dur="indefinite" nodeType="mainSeq">
+                <p:childTnLst>
+                  <p:par>
+                    <p:cTn id="3" fill="hold" nodeType="clickPar">
+                      <p:stCondLst>
+                        <p:cond delay="indefinite"/>
+                        <p:cond evt="onBegin" delay="0">
+                          <p:tn val="2"/>
+                        </p:cond>
+                      </p:stCondLst>
+                      <p:childTnLst>
+                        <p:par>
+                          <p:cTn id="4" fill="hold" nodeType="withGroup">
+                            <p:stCondLst>
+                              <p:cond delay="0"/>
+                            </p:stCondLst>
+                            <p:childTnLst>
+                              <p:par>
+                                <p:cTn id="5" presetID="1" presetClass="entr" presetSubtype="0" fill="hold" grpId="0" nodeType="withEffect">
+                                  <p:stCondLst>
+                                    <p:cond delay="0"/>
+                                  </p:stCondLst>
+                                  <p:childTnLst>
+                                    <p:set>
+                                      <p:cBhvr>
+                                        <p:cTn id="6" dur="1" fill="hold">
+                                          <p:stCondLst>
+                                            <p:cond delay="0"/>
+                                          </p:stCondLst>
+                                        </p:cTn>
+                                        <p:tgtEl>
+                                          <p:spTgt spid="35843">
+                                            <p:txEl>
+                                              <p:pRg st="0" end="0"/>
+                                            </p:txEl>
+                                          </p:spTgt>
+                                        </p:tgtEl>
+                                        <p:attrNameLst>
+                                          <p:attrName>style.visibility</p:attrName>
+                                        </p:attrNameLst>
+                                      </p:cBhvr>
+                                      <p:to>
+                                        <p:strVal val="visible"/>
+                                      </p:to>
+                                    </p:set>
+                                  </p:childTnLst>
+                                </p:cTn>
+                              </p:par>
+                              <p:par>
+                                <p:cTn id="7" presetID="1" presetClass="entr" presetSubtype="0" fill="hold" grpId="0" nodeType="withEffect">
+                                  <p:stCondLst>
+                                    <p:cond delay="0"/>
+                                  </p:stCondLst>
+                                  <p:childTnLst>
+                                    <p:set>
+                                      <p:cBhvr>
+                                        <p:cTn id="8" dur="1" fill="hold">
+                                          <p:stCondLst>
+                                            <p:cond delay="0"/>
+                                          </p:stCondLst>
+                                        </p:cTn>
+                                        <p:tgtEl>
+                                          <p:spTgt spid="35843">
+                                            <p:txEl>
+                                              <p:pRg st="1" end="1"/>
+                                            </p:txEl>
+                                          </p:spTgt>
+                                        </p:tgtEl>
+                                        <p:attrNameLst>
+                                          <p:attrName>style.visibility</p:attrName>
+                                        </p:attrNameLst>
+                                      </p:cBhvr>
+                                      <p:to>
+                                        <p:strVal val="visible"/>
+                                      </p:to>
+                                    </p:set>
+                                  </p:childTnLst>
+                                </p:cTn>
+                              </p:par>
+                            </p:childTnLst>
+                          </p:cTn>
+                        </p:par>
+                      </p:childTnLst>
+                    </p:cTn>
+                  </p:par>
+                  <p:par>
+                    <p:cTn id="9" fill="hold" nodeType="clickPar">
+                      <p:stCondLst>
+                        <p:cond delay="indefinite"/>
+                      </p:stCondLst>
+                      <p:childTnLst>
+                        <p:par>
+                          <p:cTn id="10" fill="hold" nodeType="withGroup">
+                            <p:stCondLst>
+                              <p:cond delay="0"/>
+                            </p:stCondLst>
+                            <p:childTnLst>
+                              <p:par>
+                                <p:cTn id="11" presetID="1" presetClass="entr" presetSubtype="0" fill="hold" grpId="0" nodeType="clickEffect">
+                                  <p:stCondLst>
+                                    <p:cond delay="0"/>
+                                  </p:stCondLst>
+                                  <p:childTnLst>
+                                    <p:set>
+                                      <p:cBhvr>
+                                        <p:cTn id="12" dur="1" fill="hold">
+                                          <p:stCondLst>
+                                            <p:cond delay="0"/>
+                                          </p:stCondLst>
+                                        </p:cTn>
+                                        <p:tgtEl>
+                                          <p:spTgt spid="35843">
+                                            <p:txEl>
+                                              <p:pRg st="2" end="2"/>
+                                            </p:txEl>
+                                          </p:spTgt>
+                                        </p:tgtEl>
+                                        <p:attrNameLst>
+                                          <p:attrName>style.visibility</p:attrName>
+                                        </p:attrNameLst>
+                                      </p:cBhvr>
+                                      <p:to>
+                                        <p:strVal val="visible"/>
+                                      </p:to>
+                                    </p:set>
+                                  </p:childTnLst>
+                                </p:cTn>
+                              </p:par>
+                              <p:par>
+                                <p:cTn id="13" presetID="1" presetClass="entr" presetSubtype="0" fill="hold" grpId="0" nodeType="withEffect">
+                                  <p:stCondLst>
+                                    <p:cond delay="0"/>
+                                  </p:stCondLst>
+                                  <p:childTnLst>
+                                    <p:set>
+                                      <p:cBhvr>
+                                        <p:cTn id="14" dur="1" fill="hold">
+                                          <p:stCondLst>
+                                            <p:cond delay="0"/>
+                                          </p:stCondLst>
+                                        </p:cTn>
+                                        <p:tgtEl>
+                                          <p:spTgt spid="35846"/>
+                                        </p:tgtEl>
+                                        <p:attrNameLst>
+                                          <p:attrName>style.visibility</p:attrName>
+                                        </p:attrNameLst>
+                                      </p:cBhvr>
+                                      <p:to>
+                                        <p:strVal val="visible"/>
+                                      </p:to>
+                                    </p:set>
+                                  </p:childTnLst>
+                                </p:cTn>
+                              </p:par>
+                              <p:par>
+                                <p:cTn id="15" presetID="1" presetClass="entr" presetSubtype="0" fill="hold" grpId="0" nodeType="withEffect">
+                                  <p:stCondLst>
+                                    <p:cond delay="0"/>
+                                  </p:stCondLst>
+                                  <p:childTnLst>
+                                    <p:set>
+                                      <p:cBhvr>
+                                        <p:cTn id="16" dur="1" fill="hold">
+                                          <p:stCondLst>
+                                            <p:cond delay="0"/>
+                                          </p:stCondLst>
+                                        </p:cTn>
+                                        <p:tgtEl>
+                                          <p:spTgt spid="5"/>
+                                        </p:tgtEl>
+                                        <p:attrNameLst>
+                                          <p:attrName>style.visibility</p:attrName>
+                                        </p:attrNameLst>
+                                      </p:cBhvr>
+                                      <p:to>
+                                        <p:strVal val="visible"/>
+                                      </p:to>
+                                    </p:set>
+                                  </p:childTnLst>
+                                </p:cTn>
+                              </p:par>
+                            </p:childTnLst>
+                          </p:cTn>
+                        </p:par>
+                      </p:childTnLst>
+                    </p:cTn>
+                  </p:par>
+                  <p:par>
+                    <p:cTn id="17" fill="hold" nodeType="clickPar">
+                      <p:stCondLst>
+                        <p:cond delay="indefinite"/>
+                      </p:stCondLst>
+                      <p:childTnLst>
+                        <p:par>
+                          <p:cTn id="18" fill="hold" nodeType="withGroup">
+                            <p:stCondLst>
+                              <p:cond delay="0"/>
+                            </p:stCondLst>
+                            <p:childTnLst>
+                              <p:par>
+                                <p:cTn id="19" presetID="1" presetClass="entr" presetSubtype="0" fill="hold" grpId="0" nodeType="clickEffect">
+                                  <p:stCondLst>
+                                    <p:cond delay="0"/>
+                                  </p:stCondLst>
+                                  <p:childTnLst>
+                                    <p:set>
+                                      <p:cBhvr>
+                                        <p:cTn id="20" dur="1" fill="hold">
+                                          <p:stCondLst>
+                                            <p:cond delay="0"/>
+                                          </p:stCondLst>
+                                        </p:cTn>
+                                        <p:tgtEl>
+                                          <p:spTgt spid="35843">
+                                            <p:txEl>
+                                              <p:pRg st="3" end="3"/>
+                                            </p:txEl>
+                                          </p:spTgt>
+                                        </p:tgtEl>
+                                        <p:attrNameLst>
+                                          <p:attrName>style.visibility</p:attrName>
+                                        </p:attrNameLst>
+                                      </p:cBhvr>
+                                      <p:to>
+                                        <p:strVal val="visible"/>
+                                      </p:to>
+                                    </p:set>
+                                  </p:childTnLst>
+                                </p:cTn>
+                              </p:par>
+                              <p:par>
+                                <p:cTn id="21" presetID="1" presetClass="entr" presetSubtype="0" fill="hold" grpId="0" nodeType="withEffect">
+                                  <p:stCondLst>
+                                    <p:cond delay="0"/>
+                                  </p:stCondLst>
+                                  <p:childTnLst>
+                                    <p:set>
+                                      <p:cBhvr>
+                                        <p:cTn id="22" dur="1" fill="hold">
+                                          <p:stCondLst>
+                                            <p:cond delay="0"/>
+                                          </p:stCondLst>
+                                        </p:cTn>
+                                        <p:tgtEl>
+                                          <p:spTgt spid="35843">
+                                            <p:txEl>
+                                              <p:pRg st="4" end="4"/>
+                                            </p:txEl>
+                                          </p:spTgt>
+                                        </p:tgtEl>
+                                        <p:attrNameLst>
+                                          <p:attrName>style.visibility</p:attrName>
+                                        </p:attrNameLst>
+                                      </p:cBhvr>
+                                      <p:to>
+                                        <p:strVal val="visible"/>
+                                      </p:to>
+                                    </p:set>
+                                  </p:childTnLst>
+                                </p:cTn>
+                              </p:par>
+                              <p:par>
+                                <p:cTn id="23" presetID="1" presetClass="entr" presetSubtype="0" fill="hold" grpId="0" nodeType="withEffect">
+                                  <p:stCondLst>
+                                    <p:cond delay="0"/>
+                                  </p:stCondLst>
+                                  <p:childTnLst>
+                                    <p:set>
+                                      <p:cBhvr>
+                                        <p:cTn id="24" dur="1" fill="hold">
+                                          <p:stCondLst>
+                                            <p:cond delay="0"/>
+                                          </p:stCondLst>
+                                        </p:cTn>
+                                        <p:tgtEl>
+                                          <p:spTgt spid="35843">
+                                            <p:txEl>
+                                              <p:pRg st="5" end="5"/>
+                                            </p:txEl>
+                                          </p:spTgt>
+                                        </p:tgtEl>
+                                        <p:attrNameLst>
+                                          <p:attrName>style.visibility</p:attrName>
+                                        </p:attrNameLst>
+                                      </p:cBhvr>
+                                      <p:to>
+                                        <p:strVal val="visible"/>
+                                      </p:to>
+                                    </p:set>
+                                  </p:childTnLst>
+                                </p:cTn>
+                              </p:par>
+                              <p:par>
+                                <p:cTn id="25" presetID="1" presetClass="entr" presetSubtype="0" fill="hold" grpId="0" nodeType="withEffect">
+                                  <p:stCondLst>
+                                    <p:cond delay="0"/>
+                                  </p:stCondLst>
+                                  <p:childTnLst>
+                                    <p:set>
+                                      <p:cBhvr>
+                                        <p:cTn id="26" dur="1" fill="hold">
+                                          <p:stCondLst>
+                                            <p:cond delay="0"/>
+                                          </p:stCondLst>
+                                        </p:cTn>
+                                        <p:tgtEl>
+                                          <p:spTgt spid="35843">
+                                            <p:txEl>
+                                              <p:pRg st="6" end="6"/>
+                                            </p:txEl>
+                                          </p:spTgt>
+                                        </p:tgtEl>
+                                        <p:attrNameLst>
+                                          <p:attrName>style.visibility</p:attrName>
+                                        </p:attrNameLst>
+                                      </p:cBhvr>
+                                      <p:to>
+                                        <p:strVal val="visible"/>
+                                      </p:to>
+                                    </p:set>
+                                  </p:childTnLst>
+                                </p:cTn>
+                              </p:par>
+                            </p:childTnLst>
+                          </p:cTn>
+                        </p:par>
+                      </p:childTnLst>
+                    </p:cTn>
+                  </p:par>
+                </p:childTnLst>
+              </p:cTn>
+              <p:prevCondLst>
+                <p:cond evt="onPrev" delay="0">
+                  <p:tgtEl>
+                    <p:sldTgt/>
+                  </p:tgtEl>
+                </p:cond>
+              </p:prevCondLst>
+              <p:nextCondLst>
+                <p:cond evt="onNext" delay="0">
+                  <p:tgtEl>
+                    <p:sldTgt/>
+                  </p:tgtEl>
+                </p:cond>
+              </p:nextCondLst>
+            </p:seq>
+          </p:childTnLst>
+        </p:cTn>
       </p:par>
     </p:tnLst>
+    <p:bldLst>
+      <p:bldP spid="35843" grpId="0" build="p"/>
+      <p:bldP spid="35846" grpId="0"/>
+      <p:bldP spid="5" grpId="0" animBg="1"/>
+    </p:bldLst>
   </p:timing>
 </p:sld>
 </file>
 
-<file path=ppt/slides/slide10.xml><?xml version="1.0" encoding="utf-8"?>
+<file path=ppt/slides/slide12.xml><?xml version="1.0" encoding="utf-8"?>
 <p:sld xmlns:a="http://schemas.openxmlformats.org/drawingml/2006/main" xmlns:r="http://schemas.openxmlformats.org/officeDocument/2006/relationships" xmlns:p="http://schemas.openxmlformats.org/presentationml/2006/main">
   <p:cSld>
     <p:spTree>
@@ -4843,105 +5608,6 @@
             <p:ph type="ctrTitle"/>
           </p:nvPr>
         </p:nvSpPr>
-        <p:spPr>
-          <a:xfrm>
-            <a:off x="685800" y="1889125"/>
-            <a:ext cx="7772400" cy="2886075"/>
-          </a:xfrm>
-        </p:spPr>
-        <p:txBody>
-          <a:bodyPr>
-            <a:noAutofit/>
-          </a:bodyPr>
-          <a:lstStyle/>
-          <a:p>
-            <a:r>
-              <a:rPr lang="en-US" sz="3200" dirty="0" smtClean="0"/>
-              <a:t>These 7 concepts can be combined </a:t>
-            </a:r>
-            <a:r>
-              <a:rPr lang="en-US" sz="3200" dirty="0"/>
-              <a:t>in infinitely many </a:t>
-            </a:r>
-            <a:r>
-              <a:rPr lang="en-US" sz="3200" dirty="0" smtClean="0"/>
-              <a:t>ways. </a:t>
-            </a:r>
-            <a:r>
-              <a:rPr lang="en-US" sz="3200" dirty="0"/>
-              <a:t>O</a:t>
-            </a:r>
-            <a:r>
-              <a:rPr lang="en-US" sz="3200" dirty="0" smtClean="0"/>
-              <a:t>nce </a:t>
-            </a:r>
-            <a:r>
-              <a:rPr lang="en-US" sz="3200" dirty="0"/>
-              <a:t>mastered, </a:t>
-            </a:r>
-            <a:r>
-              <a:rPr lang="en-US" sz="3200" dirty="0" smtClean="0"/>
-              <a:t>you can implement </a:t>
-            </a:r>
-            <a:r>
-              <a:rPr lang="en-US" sz="3200" dirty="0"/>
-              <a:t>any program that's ever been written, in any programming </a:t>
-            </a:r>
-            <a:r>
-              <a:rPr lang="en-US" sz="3200" dirty="0" smtClean="0"/>
-              <a:t>language.</a:t>
-            </a:r>
-            <a:endParaRPr lang="en-US" sz="3200" dirty="0"/>
-          </a:p>
-        </p:txBody>
-      </p:sp>
-    </p:spTree>
-    <p:extLst>
-      <p:ext uri="{BB962C8B-B14F-4D97-AF65-F5344CB8AC3E}">
-        <p14:creationId xmlns:p14="http://schemas.microsoft.com/office/powerpoint/2010/main" val="1097651736"/>
-      </p:ext>
-    </p:extLst>
-  </p:cSld>
-  <p:clrMapOvr>
-    <a:masterClrMapping/>
-  </p:clrMapOvr>
-  <p:timing>
-    <p:tnLst>
-      <p:par>
-        <p:cTn xmlns:p14="http://schemas.microsoft.com/office/powerpoint/2010/main" id="1" dur="indefinite" restart="never" nodeType="tmRoot"/>
-      </p:par>
-    </p:tnLst>
-  </p:timing>
-</p:sld>
-</file>
-
-<file path=ppt/slides/slide11.xml><?xml version="1.0" encoding="utf-8"?>
-<p:sld xmlns:a="http://schemas.openxmlformats.org/drawingml/2006/main" xmlns:r="http://schemas.openxmlformats.org/officeDocument/2006/relationships" xmlns:p="http://schemas.openxmlformats.org/presentationml/2006/main">
-  <p:cSld>
-    <p:spTree>
-      <p:nvGrpSpPr>
-        <p:cNvPr id="1" name=""/>
-        <p:cNvGrpSpPr/>
-        <p:nvPr/>
-      </p:nvGrpSpPr>
-      <p:grpSpPr>
-        <a:xfrm>
-          <a:off x="0" y="0"/>
-          <a:ext cx="0" cy="0"/>
-          <a:chOff x="0" y="0"/>
-          <a:chExt cx="0" cy="0"/>
-        </a:xfrm>
-      </p:grpSpPr>
-      <p:sp>
-        <p:nvSpPr>
-          <p:cNvPr id="2" name="Title 1"/>
-          <p:cNvSpPr>
-            <a:spLocks noGrp="1"/>
-          </p:cNvSpPr>
-          <p:nvPr>
-            <p:ph type="ctrTitle"/>
-          </p:nvPr>
-        </p:nvSpPr>
         <p:spPr/>
         <p:txBody>
           <a:bodyPr/>
@@ -4976,7 +5642,11 @@
             </a:r>
             <a:r>
               <a:rPr lang="en-US" dirty="0" smtClean="0"/>
-              <a:t> WOD</a:t>
+              <a:t> </a:t>
+            </a:r>
+            <a:r>
+              <a:rPr lang="en-US" dirty="0" smtClean="0"/>
+              <a:t>HW Stage 2</a:t>
             </a:r>
             <a:endParaRPr lang="en-US" dirty="0"/>
           </a:p>
@@ -5010,7 +5680,7 @@
 </p:sld>
 </file>
 
-<file path=ppt/slides/slide12.xml><?xml version="1.0" encoding="utf-8"?>
+<file path=ppt/slides/slide13.xml><?xml version="1.0" encoding="utf-8"?>
 <p:sld xmlns:a="http://schemas.openxmlformats.org/drawingml/2006/main" xmlns:r="http://schemas.openxmlformats.org/officeDocument/2006/relationships" xmlns:p="http://schemas.openxmlformats.org/presentationml/2006/main">
   <p:cSld>
     <p:spTree>
@@ -5097,7 +5767,7 @@
 </p:sld>
 </file>
 
-<file path=ppt/slides/slide13.xml><?xml version="1.0" encoding="utf-8"?>
+<file path=ppt/slides/slide14.xml><?xml version="1.0" encoding="utf-8"?>
 <p:sld xmlns:a="http://schemas.openxmlformats.org/drawingml/2006/main" xmlns:r="http://schemas.openxmlformats.org/officeDocument/2006/relationships" xmlns:p="http://schemas.openxmlformats.org/presentationml/2006/main" show="0">
   <p:cSld>
     <p:spTree>
@@ -5245,7 +5915,7 @@
 </p:sld>
 </file>
 
-<file path=ppt/slides/slide14.xml><?xml version="1.0" encoding="utf-8"?>
+<file path=ppt/slides/slide15.xml><?xml version="1.0" encoding="utf-8"?>
 <p:sld xmlns:a="http://schemas.openxmlformats.org/drawingml/2006/main" xmlns:r="http://schemas.openxmlformats.org/officeDocument/2006/relationships" xmlns:p="http://schemas.openxmlformats.org/presentationml/2006/main">
   <p:cSld>
     <p:spTree>
@@ -5765,7 +6435,7 @@
 </p:sld>
 </file>
 
-<file path=ppt/slides/slide15.xml><?xml version="1.0" encoding="utf-8"?>
+<file path=ppt/slides/slide16.xml><?xml version="1.0" encoding="utf-8"?>
 <p:sld xmlns:a="http://schemas.openxmlformats.org/drawingml/2006/main" xmlns:r="http://schemas.openxmlformats.org/officeDocument/2006/relationships" xmlns:p="http://schemas.openxmlformats.org/presentationml/2006/main">
   <p:cSld>
     <p:spTree>
@@ -6124,7 +6794,7 @@
 </p:sld>
 </file>
 
-<file path=ppt/slides/slide16.xml><?xml version="1.0" encoding="utf-8"?>
+<file path=ppt/slides/slide17.xml><?xml version="1.0" encoding="utf-8"?>
 <p:sld xmlns:a="http://schemas.openxmlformats.org/drawingml/2006/main" xmlns:r="http://schemas.openxmlformats.org/officeDocument/2006/relationships" xmlns:p="http://schemas.openxmlformats.org/presentationml/2006/main">
   <p:cSld>
     <p:spTree>
@@ -6525,72 +7195,6 @@
 </p:sld>
 </file>
 
-<file path=ppt/slides/slide17.xml><?xml version="1.0" encoding="utf-8"?>
-<p:sld xmlns:a="http://schemas.openxmlformats.org/drawingml/2006/main" xmlns:r="http://schemas.openxmlformats.org/officeDocument/2006/relationships" xmlns:p="http://schemas.openxmlformats.org/presentationml/2006/main">
-  <p:cSld>
-    <p:spTree>
-      <p:nvGrpSpPr>
-        <p:cNvPr id="1" name=""/>
-        <p:cNvGrpSpPr/>
-        <p:nvPr/>
-      </p:nvGrpSpPr>
-      <p:grpSpPr>
-        <a:xfrm>
-          <a:off x="0" y="0"/>
-          <a:ext cx="0" cy="0"/>
-          <a:chOff x="0" y="0"/>
-          <a:chExt cx="0" cy="0"/>
-        </a:xfrm>
-      </p:grpSpPr>
-      <p:sp>
-        <p:nvSpPr>
-          <p:cNvPr id="2" name="Title 1"/>
-          <p:cNvSpPr>
-            <a:spLocks noGrp="1"/>
-          </p:cNvSpPr>
-          <p:nvPr>
-            <p:ph type="ctrTitle"/>
-          </p:nvPr>
-        </p:nvSpPr>
-        <p:spPr>
-          <a:xfrm>
-            <a:off x="1269999" y="1850573"/>
-            <a:ext cx="6607629" cy="3175000"/>
-          </a:xfrm>
-        </p:spPr>
-        <p:txBody>
-          <a:bodyPr>
-            <a:normAutofit/>
-          </a:bodyPr>
-          <a:lstStyle/>
-          <a:p>
-            <a:r>
-              <a:rPr lang="en-US" sz="3600" dirty="0"/>
-              <a:t>In this class, we’ll use UNIX to develop our python programs.</a:t>
-            </a:r>
-          </a:p>
-        </p:txBody>
-      </p:sp>
-    </p:spTree>
-    <p:extLst>
-      <p:ext uri="{BB962C8B-B14F-4D97-AF65-F5344CB8AC3E}">
-        <p14:creationId xmlns:p14="http://schemas.microsoft.com/office/powerpoint/2010/main" val="1715234749"/>
-      </p:ext>
-    </p:extLst>
-  </p:cSld>
-  <p:clrMapOvr>
-    <a:masterClrMapping/>
-  </p:clrMapOvr>
-  <p:timing>
-    <p:tnLst>
-      <p:par>
-        <p:cTn xmlns:p14="http://schemas.microsoft.com/office/powerpoint/2010/main" id="1" dur="indefinite" restart="never" nodeType="tmRoot"/>
-      </p:par>
-    </p:tnLst>
-  </p:timing>
-</p:sld>
-</file>
-
 <file path=ppt/slides/slide18.xml><?xml version="1.0" encoding="utf-8"?>
 <p:sld xmlns:a="http://schemas.openxmlformats.org/drawingml/2006/main" xmlns:r="http://schemas.openxmlformats.org/officeDocument/2006/relationships" xmlns:p="http://schemas.openxmlformats.org/presentationml/2006/main">
   <p:cSld>
@@ -6618,42 +7222,29 @@
             <p:ph type="ctrTitle"/>
           </p:nvPr>
         </p:nvSpPr>
-        <p:spPr/>
-        <p:txBody>
-          <a:bodyPr/>
+        <p:spPr>
+          <a:xfrm>
+            <a:off x="1269999" y="1850573"/>
+            <a:ext cx="6607629" cy="3175000"/>
+          </a:xfrm>
+        </p:spPr>
+        <p:txBody>
+          <a:bodyPr>
+            <a:normAutofit/>
+          </a:bodyPr>
           <a:lstStyle/>
           <a:p>
             <a:r>
-              <a:rPr lang="en-US" dirty="0" smtClean="0"/>
-              <a:t>DEMO TIME</a:t>
-            </a:r>
-            <a:endParaRPr lang="en-US" dirty="0"/>
-          </a:p>
-        </p:txBody>
-      </p:sp>
-      <p:sp>
-        <p:nvSpPr>
-          <p:cNvPr id="3" name="Subtitle 2"/>
-          <p:cNvSpPr>
-            <a:spLocks noGrp="1"/>
-          </p:cNvSpPr>
-          <p:nvPr>
-            <p:ph type="subTitle" idx="1"/>
-          </p:nvPr>
-        </p:nvSpPr>
-        <p:spPr/>
-        <p:txBody>
-          <a:bodyPr/>
-          <a:lstStyle/>
-          <a:p>
-            <a:endParaRPr lang="en-US"/>
+              <a:rPr lang="en-US" sz="3600" dirty="0"/>
+              <a:t>In this class, we’ll use UNIX to develop our python programs.</a:t>
+            </a:r>
           </a:p>
         </p:txBody>
       </p:sp>
     </p:spTree>
     <p:extLst>
       <p:ext uri="{BB962C8B-B14F-4D97-AF65-F5344CB8AC3E}">
-        <p14:creationId xmlns:p14="http://schemas.microsoft.com/office/powerpoint/2010/main" val="483300362"/>
+        <p14:creationId xmlns:p14="http://schemas.microsoft.com/office/powerpoint/2010/main" val="1715234749"/>
       </p:ext>
     </p:extLst>
   </p:cSld>
@@ -6694,22 +7285,17 @@
             <a:spLocks noGrp="1"/>
           </p:cNvSpPr>
           <p:nvPr>
-            <p:ph type="title"/>
-          </p:nvPr>
-        </p:nvSpPr>
-        <p:spPr>
-          <a:xfrm>
-            <a:off x="457200" y="-143162"/>
-            <a:ext cx="8229600" cy="1143000"/>
-          </a:xfrm>
-        </p:spPr>
+            <p:ph type="ctrTitle"/>
+          </p:nvPr>
+        </p:nvSpPr>
+        <p:spPr/>
         <p:txBody>
           <a:bodyPr/>
           <a:lstStyle/>
           <a:p>
             <a:r>
               <a:rPr lang="en-US" dirty="0" smtClean="0"/>
-              <a:t>Basic UNIX commands</a:t>
+              <a:t>DEMO TIME</a:t>
             </a:r>
             <a:endParaRPr lang="en-US" dirty="0"/>
           </a:p>
@@ -6717,234 +7303,27 @@
       </p:sp>
       <p:sp>
         <p:nvSpPr>
-          <p:cNvPr id="3" name="Content Placeholder 2"/>
-          <p:cNvSpPr>
-            <a:spLocks noGrp="1"/>
-          </p:cNvSpPr>
-          <p:nvPr>
-            <p:ph idx="1"/>
-          </p:nvPr>
-        </p:nvSpPr>
-        <p:spPr>
-          <a:xfrm>
-            <a:off x="457200" y="965144"/>
-            <a:ext cx="8229600" cy="5184704"/>
-          </a:xfrm>
-        </p:spPr>
-        <p:txBody>
-          <a:bodyPr>
-            <a:normAutofit fontScale="85000" lnSpcReduction="20000"/>
-          </a:bodyPr>
+          <p:cNvPr id="3" name="Subtitle 2"/>
+          <p:cNvSpPr>
+            <a:spLocks noGrp="1"/>
+          </p:cNvSpPr>
+          <p:nvPr>
+            <p:ph type="subTitle" idx="1"/>
+          </p:nvPr>
+        </p:nvSpPr>
+        <p:spPr/>
+        <p:txBody>
+          <a:bodyPr/>
           <a:lstStyle/>
           <a:p>
-            <a:r>
-              <a:rPr lang="en-US" dirty="0" err="1" smtClean="0"/>
-              <a:t>ls</a:t>
-            </a:r>
-            <a:r>
-              <a:rPr lang="en-US" dirty="0" smtClean="0"/>
-              <a:t>: directory </a:t>
-            </a:r>
-            <a:r>
-              <a:rPr lang="en-US" b="1" dirty="0" smtClean="0"/>
-              <a:t>l</a:t>
-            </a:r>
-            <a:r>
-              <a:rPr lang="en-US" dirty="0" smtClean="0"/>
-              <a:t>i</a:t>
-            </a:r>
-            <a:r>
-              <a:rPr lang="en-US" b="1" dirty="0" smtClean="0"/>
-              <a:t>s</a:t>
-            </a:r>
-            <a:r>
-              <a:rPr lang="en-US" dirty="0" smtClean="0"/>
-              <a:t>ting</a:t>
-            </a:r>
-          </a:p>
-          <a:p>
-            <a:r>
-              <a:rPr lang="en-US" dirty="0" err="1" smtClean="0"/>
-              <a:t>pwd</a:t>
-            </a:r>
-            <a:r>
-              <a:rPr lang="en-US" dirty="0" smtClean="0"/>
-              <a:t>: </a:t>
-            </a:r>
-            <a:r>
-              <a:rPr lang="en-US" b="1" dirty="0" smtClean="0"/>
-              <a:t>p</a:t>
-            </a:r>
-            <a:r>
-              <a:rPr lang="en-US" dirty="0" smtClean="0"/>
-              <a:t>resent </a:t>
-            </a:r>
-            <a:r>
-              <a:rPr lang="en-US" b="1" dirty="0" smtClean="0"/>
-              <a:t>w</a:t>
-            </a:r>
-            <a:r>
-              <a:rPr lang="en-US" dirty="0" smtClean="0"/>
-              <a:t>orking </a:t>
-            </a:r>
-            <a:r>
-              <a:rPr lang="en-US" b="1" dirty="0" smtClean="0"/>
-              <a:t>d</a:t>
-            </a:r>
-            <a:r>
-              <a:rPr lang="en-US" dirty="0" smtClean="0"/>
-              <a:t>irectory</a:t>
-            </a:r>
-          </a:p>
-          <a:p>
-            <a:r>
-              <a:rPr lang="en-US" dirty="0" smtClean="0"/>
-              <a:t>cd: </a:t>
-            </a:r>
-            <a:r>
-              <a:rPr lang="en-US" b="1" dirty="0" smtClean="0"/>
-              <a:t>c</a:t>
-            </a:r>
-            <a:r>
-              <a:rPr lang="en-US" dirty="0" smtClean="0"/>
-              <a:t>hange </a:t>
-            </a:r>
-            <a:r>
-              <a:rPr lang="en-US" b="1" dirty="0" smtClean="0"/>
-              <a:t>d</a:t>
-            </a:r>
-            <a:r>
-              <a:rPr lang="en-US" dirty="0" smtClean="0"/>
-              <a:t>irectory</a:t>
-            </a:r>
-          </a:p>
-          <a:p>
-            <a:r>
-              <a:rPr lang="en-US" dirty="0" smtClean="0"/>
-              <a:t>cat: display (i.e., con</a:t>
-            </a:r>
-            <a:r>
-              <a:rPr lang="en-US" b="1" dirty="0" smtClean="0"/>
-              <a:t>cat</a:t>
-            </a:r>
-            <a:r>
-              <a:rPr lang="en-US" dirty="0" smtClean="0"/>
-              <a:t>enate) to the screen</a:t>
-            </a:r>
-          </a:p>
-          <a:p>
-            <a:r>
-              <a:rPr lang="en-US" dirty="0" err="1"/>
-              <a:t>r</a:t>
-            </a:r>
-            <a:r>
-              <a:rPr lang="en-US" dirty="0" err="1" smtClean="0"/>
-              <a:t>m</a:t>
-            </a:r>
-            <a:r>
-              <a:rPr lang="en-US" dirty="0" smtClean="0"/>
-              <a:t>: </a:t>
-            </a:r>
-            <a:r>
-              <a:rPr lang="en-US" b="1" dirty="0" smtClean="0"/>
-              <a:t>r</a:t>
-            </a:r>
-            <a:r>
-              <a:rPr lang="en-US" dirty="0" smtClean="0"/>
-              <a:t>e</a:t>
-            </a:r>
-            <a:r>
-              <a:rPr lang="en-US" b="1" dirty="0" smtClean="0"/>
-              <a:t>m</a:t>
-            </a:r>
-            <a:r>
-              <a:rPr lang="en-US" dirty="0" smtClean="0"/>
-              <a:t>ove</a:t>
-            </a:r>
-          </a:p>
-          <a:p>
-            <a:r>
-              <a:rPr lang="en-US" dirty="0" err="1" smtClean="0"/>
-              <a:t>cp</a:t>
-            </a:r>
-            <a:r>
-              <a:rPr lang="en-US" dirty="0" smtClean="0"/>
-              <a:t>: </a:t>
-            </a:r>
-            <a:r>
-              <a:rPr lang="en-US" b="1" dirty="0" smtClean="0"/>
-              <a:t>c</a:t>
-            </a:r>
-            <a:r>
-              <a:rPr lang="en-US" dirty="0" smtClean="0"/>
-              <a:t>o</a:t>
-            </a:r>
-            <a:r>
-              <a:rPr lang="en-US" b="1" dirty="0" smtClean="0"/>
-              <a:t>p</a:t>
-            </a:r>
-            <a:r>
-              <a:rPr lang="en-US" dirty="0" smtClean="0"/>
-              <a:t>y</a:t>
-            </a:r>
-          </a:p>
-          <a:p>
-            <a:r>
-              <a:rPr lang="en-US" dirty="0"/>
-              <a:t>m</a:t>
-            </a:r>
-            <a:r>
-              <a:rPr lang="en-US" dirty="0" smtClean="0"/>
-              <a:t>an: </a:t>
-            </a:r>
-            <a:r>
-              <a:rPr lang="en-US" b="1" dirty="0" smtClean="0"/>
-              <a:t>man</a:t>
-            </a:r>
-            <a:r>
-              <a:rPr lang="en-US" dirty="0" smtClean="0"/>
-              <a:t>ual page</a:t>
-            </a:r>
-          </a:p>
-          <a:p>
-            <a:r>
-              <a:rPr lang="en-US" dirty="0" smtClean="0"/>
-              <a:t>touch: create an empty file</a:t>
-            </a:r>
-          </a:p>
-          <a:p>
-            <a:r>
-              <a:rPr lang="en-US" dirty="0" smtClean="0"/>
-              <a:t>.: current directory</a:t>
-            </a:r>
-          </a:p>
-          <a:p>
-            <a:r>
-              <a:rPr lang="en-US" dirty="0" smtClean="0"/>
-              <a:t>..: parent directory</a:t>
-            </a:r>
-          </a:p>
-          <a:p>
-            <a:r>
-              <a:rPr lang="en-US" dirty="0"/>
-              <a:t>[tab]: autocomplete</a:t>
-            </a:r>
-          </a:p>
-          <a:p>
-            <a:r>
-              <a:rPr lang="en-US" dirty="0" smtClean="0"/>
-              <a:t>[↑]: previously entered command</a:t>
-            </a:r>
-          </a:p>
-          <a:p>
-            <a:endParaRPr lang="en-US" dirty="0"/>
+            <a:endParaRPr lang="en-US"/>
           </a:p>
         </p:txBody>
       </p:sp>
     </p:spTree>
     <p:extLst>
       <p:ext uri="{BB962C8B-B14F-4D97-AF65-F5344CB8AC3E}">
-        <p14:creationId xmlns:p14="http://schemas.microsoft.com/office/powerpoint/2010/main" val="1026305898"/>
+        <p14:creationId xmlns:p14="http://schemas.microsoft.com/office/powerpoint/2010/main" val="483300362"/>
       </p:ext>
     </p:extLst>
   </p:cSld>
@@ -7042,6 +7421,297 @@
       <p:transition xmlns:p14="http://schemas.microsoft.com/office/powerpoint/2010/main" spd="slow"/>
     </mc:Fallback>
   </mc:AlternateContent>
+  <p:timing>
+    <p:tnLst>
+      <p:par>
+        <p:cTn xmlns:p14="http://schemas.microsoft.com/office/powerpoint/2010/main" id="1" dur="indefinite" restart="never" nodeType="tmRoot"/>
+      </p:par>
+    </p:tnLst>
+  </p:timing>
+</p:sld>
+</file>
+
+<file path=ppt/slides/slide20.xml><?xml version="1.0" encoding="utf-8"?>
+<p:sld xmlns:a="http://schemas.openxmlformats.org/drawingml/2006/main" xmlns:r="http://schemas.openxmlformats.org/officeDocument/2006/relationships" xmlns:p="http://schemas.openxmlformats.org/presentationml/2006/main">
+  <p:cSld>
+    <p:spTree>
+      <p:nvGrpSpPr>
+        <p:cNvPr id="1" name=""/>
+        <p:cNvGrpSpPr/>
+        <p:nvPr/>
+      </p:nvGrpSpPr>
+      <p:grpSpPr>
+        <a:xfrm>
+          <a:off x="0" y="0"/>
+          <a:ext cx="0" cy="0"/>
+          <a:chOff x="0" y="0"/>
+          <a:chExt cx="0" cy="0"/>
+        </a:xfrm>
+      </p:grpSpPr>
+      <p:sp>
+        <p:nvSpPr>
+          <p:cNvPr id="2" name="Title 1"/>
+          <p:cNvSpPr>
+            <a:spLocks noGrp="1"/>
+          </p:cNvSpPr>
+          <p:nvPr>
+            <p:ph type="title"/>
+          </p:nvPr>
+        </p:nvSpPr>
+        <p:spPr>
+          <a:xfrm>
+            <a:off x="457200" y="-143162"/>
+            <a:ext cx="8229600" cy="1143000"/>
+          </a:xfrm>
+        </p:spPr>
+        <p:txBody>
+          <a:bodyPr/>
+          <a:lstStyle/>
+          <a:p>
+            <a:r>
+              <a:rPr lang="en-US" dirty="0" smtClean="0"/>
+              <a:t>Basic UNIX commands</a:t>
+            </a:r>
+            <a:endParaRPr lang="en-US" dirty="0"/>
+          </a:p>
+        </p:txBody>
+      </p:sp>
+      <p:sp>
+        <p:nvSpPr>
+          <p:cNvPr id="3" name="Content Placeholder 2"/>
+          <p:cNvSpPr>
+            <a:spLocks noGrp="1"/>
+          </p:cNvSpPr>
+          <p:nvPr>
+            <p:ph idx="1"/>
+          </p:nvPr>
+        </p:nvSpPr>
+        <p:spPr>
+          <a:xfrm>
+            <a:off x="457200" y="965144"/>
+            <a:ext cx="8229600" cy="5184704"/>
+          </a:xfrm>
+        </p:spPr>
+        <p:txBody>
+          <a:bodyPr>
+            <a:normAutofit fontScale="85000" lnSpcReduction="20000"/>
+          </a:bodyPr>
+          <a:lstStyle/>
+          <a:p>
+            <a:r>
+              <a:rPr lang="en-US" dirty="0" err="1" smtClean="0"/>
+              <a:t>ls</a:t>
+            </a:r>
+            <a:r>
+              <a:rPr lang="en-US" dirty="0" smtClean="0"/>
+              <a:t>: directory </a:t>
+            </a:r>
+            <a:r>
+              <a:rPr lang="en-US" b="1" dirty="0" smtClean="0"/>
+              <a:t>l</a:t>
+            </a:r>
+            <a:r>
+              <a:rPr lang="en-US" dirty="0" smtClean="0"/>
+              <a:t>i</a:t>
+            </a:r>
+            <a:r>
+              <a:rPr lang="en-US" b="1" dirty="0" smtClean="0"/>
+              <a:t>s</a:t>
+            </a:r>
+            <a:r>
+              <a:rPr lang="en-US" dirty="0" smtClean="0"/>
+              <a:t>ting</a:t>
+            </a:r>
+          </a:p>
+          <a:p>
+            <a:r>
+              <a:rPr lang="en-US" dirty="0" err="1" smtClean="0"/>
+              <a:t>pwd</a:t>
+            </a:r>
+            <a:r>
+              <a:rPr lang="en-US" dirty="0" smtClean="0"/>
+              <a:t>: </a:t>
+            </a:r>
+            <a:r>
+              <a:rPr lang="en-US" b="1" dirty="0" smtClean="0"/>
+              <a:t>p</a:t>
+            </a:r>
+            <a:r>
+              <a:rPr lang="en-US" dirty="0" smtClean="0"/>
+              <a:t>resent </a:t>
+            </a:r>
+            <a:r>
+              <a:rPr lang="en-US" b="1" dirty="0" smtClean="0"/>
+              <a:t>w</a:t>
+            </a:r>
+            <a:r>
+              <a:rPr lang="en-US" dirty="0" smtClean="0"/>
+              <a:t>orking </a:t>
+            </a:r>
+            <a:r>
+              <a:rPr lang="en-US" b="1" dirty="0" smtClean="0"/>
+              <a:t>d</a:t>
+            </a:r>
+            <a:r>
+              <a:rPr lang="en-US" dirty="0" smtClean="0"/>
+              <a:t>irectory</a:t>
+            </a:r>
+          </a:p>
+          <a:p>
+            <a:r>
+              <a:rPr lang="en-US" dirty="0" smtClean="0"/>
+              <a:t>cd: </a:t>
+            </a:r>
+            <a:r>
+              <a:rPr lang="en-US" b="1" dirty="0" smtClean="0"/>
+              <a:t>c</a:t>
+            </a:r>
+            <a:r>
+              <a:rPr lang="en-US" dirty="0" smtClean="0"/>
+              <a:t>hange </a:t>
+            </a:r>
+            <a:r>
+              <a:rPr lang="en-US" b="1" dirty="0" smtClean="0"/>
+              <a:t>d</a:t>
+            </a:r>
+            <a:r>
+              <a:rPr lang="en-US" dirty="0" smtClean="0"/>
+              <a:t>irectory</a:t>
+            </a:r>
+          </a:p>
+          <a:p>
+            <a:r>
+              <a:rPr lang="en-US" dirty="0" smtClean="0"/>
+              <a:t>cat: display (i.e., con</a:t>
+            </a:r>
+            <a:r>
+              <a:rPr lang="en-US" b="1" dirty="0" smtClean="0"/>
+              <a:t>cat</a:t>
+            </a:r>
+            <a:r>
+              <a:rPr lang="en-US" dirty="0" smtClean="0"/>
+              <a:t>enate) to the screen</a:t>
+            </a:r>
+          </a:p>
+          <a:p>
+            <a:r>
+              <a:rPr lang="en-US" dirty="0" err="1"/>
+              <a:t>r</a:t>
+            </a:r>
+            <a:r>
+              <a:rPr lang="en-US" dirty="0" err="1" smtClean="0"/>
+              <a:t>m</a:t>
+            </a:r>
+            <a:r>
+              <a:rPr lang="en-US" dirty="0" smtClean="0"/>
+              <a:t>: </a:t>
+            </a:r>
+            <a:r>
+              <a:rPr lang="en-US" b="1" dirty="0" smtClean="0"/>
+              <a:t>r</a:t>
+            </a:r>
+            <a:r>
+              <a:rPr lang="en-US" dirty="0" smtClean="0"/>
+              <a:t>e</a:t>
+            </a:r>
+            <a:r>
+              <a:rPr lang="en-US" b="1" dirty="0" smtClean="0"/>
+              <a:t>m</a:t>
+            </a:r>
+            <a:r>
+              <a:rPr lang="en-US" dirty="0" smtClean="0"/>
+              <a:t>ove</a:t>
+            </a:r>
+          </a:p>
+          <a:p>
+            <a:r>
+              <a:rPr lang="en-US" dirty="0" err="1" smtClean="0"/>
+              <a:t>cp</a:t>
+            </a:r>
+            <a:r>
+              <a:rPr lang="en-US" dirty="0" smtClean="0"/>
+              <a:t>: </a:t>
+            </a:r>
+            <a:r>
+              <a:rPr lang="en-US" b="1" dirty="0" smtClean="0"/>
+              <a:t>c</a:t>
+            </a:r>
+            <a:r>
+              <a:rPr lang="en-US" dirty="0" smtClean="0"/>
+              <a:t>o</a:t>
+            </a:r>
+            <a:r>
+              <a:rPr lang="en-US" b="1" dirty="0" smtClean="0"/>
+              <a:t>p</a:t>
+            </a:r>
+            <a:r>
+              <a:rPr lang="en-US" dirty="0" smtClean="0"/>
+              <a:t>y</a:t>
+            </a:r>
+          </a:p>
+          <a:p>
+            <a:r>
+              <a:rPr lang="en-US" dirty="0"/>
+              <a:t>m</a:t>
+            </a:r>
+            <a:r>
+              <a:rPr lang="en-US" dirty="0" smtClean="0"/>
+              <a:t>an: </a:t>
+            </a:r>
+            <a:r>
+              <a:rPr lang="en-US" b="1" dirty="0" smtClean="0"/>
+              <a:t>man</a:t>
+            </a:r>
+            <a:r>
+              <a:rPr lang="en-US" dirty="0" smtClean="0"/>
+              <a:t>ual page</a:t>
+            </a:r>
+          </a:p>
+          <a:p>
+            <a:r>
+              <a:rPr lang="en-US" dirty="0" smtClean="0"/>
+              <a:t>touch: create an empty file</a:t>
+            </a:r>
+          </a:p>
+          <a:p>
+            <a:r>
+              <a:rPr lang="en-US" dirty="0" smtClean="0"/>
+              <a:t>.: current directory</a:t>
+            </a:r>
+          </a:p>
+          <a:p>
+            <a:r>
+              <a:rPr lang="en-US" dirty="0" smtClean="0"/>
+              <a:t>..: parent directory</a:t>
+            </a:r>
+          </a:p>
+          <a:p>
+            <a:r>
+              <a:rPr lang="en-US" dirty="0"/>
+              <a:t>[tab]: autocomplete</a:t>
+            </a:r>
+          </a:p>
+          <a:p>
+            <a:r>
+              <a:rPr lang="en-US" dirty="0" smtClean="0"/>
+              <a:t>[↑]: previously entered command</a:t>
+            </a:r>
+          </a:p>
+          <a:p>
+            <a:endParaRPr lang="en-US" dirty="0"/>
+          </a:p>
+        </p:txBody>
+      </p:sp>
+    </p:spTree>
+    <p:extLst>
+      <p:ext uri="{BB962C8B-B14F-4D97-AF65-F5344CB8AC3E}">
+        <p14:creationId xmlns:p14="http://schemas.microsoft.com/office/powerpoint/2010/main" val="1026305898"/>
+      </p:ext>
+    </p:extLst>
+  </p:cSld>
+  <p:clrMapOvr>
+    <a:masterClrMapping/>
+  </p:clrMapOvr>
   <p:timing>
     <p:tnLst>
       <p:par>
@@ -7883,6 +8553,673 @@
       </p:grpSpPr>
       <p:sp>
         <p:nvSpPr>
+          <p:cNvPr id="2" name="Title 1"/>
+          <p:cNvSpPr>
+            <a:spLocks noGrp="1"/>
+          </p:cNvSpPr>
+          <p:nvPr>
+            <p:ph type="title"/>
+          </p:nvPr>
+        </p:nvSpPr>
+        <p:spPr/>
+        <p:txBody>
+          <a:bodyPr/>
+          <a:lstStyle/>
+          <a:p>
+            <a:r>
+              <a:rPr lang="en-US" dirty="0" smtClean="0"/>
+              <a:t>WOD Recap</a:t>
+            </a:r>
+            <a:endParaRPr lang="en-US" dirty="0"/>
+          </a:p>
+        </p:txBody>
+      </p:sp>
+      <p:sp>
+        <p:nvSpPr>
+          <p:cNvPr id="3" name="Content Placeholder 2"/>
+          <p:cNvSpPr>
+            <a:spLocks noGrp="1"/>
+          </p:cNvSpPr>
+          <p:nvPr>
+            <p:ph idx="1"/>
+          </p:nvPr>
+        </p:nvSpPr>
+        <p:spPr/>
+        <p:txBody>
+          <a:bodyPr/>
+          <a:lstStyle/>
+          <a:p>
+            <a:r>
+              <a:rPr lang="en-US" dirty="0" smtClean="0"/>
+              <a:t>WOD = Workout of the Day</a:t>
+            </a:r>
+          </a:p>
+          <a:p>
+            <a:r>
+              <a:rPr lang="en-US" dirty="0" smtClean="0"/>
+              <a:t>Rx: prescribed time the exercise should take</a:t>
+            </a:r>
+            <a:endParaRPr lang="en-US" dirty="0"/>
+          </a:p>
+        </p:txBody>
+      </p:sp>
+    </p:spTree>
+    <p:extLst>
+      <p:ext uri="{BB962C8B-B14F-4D97-AF65-F5344CB8AC3E}">
+        <p14:creationId xmlns:p14="http://schemas.microsoft.com/office/powerpoint/2010/main" val="2739051634"/>
+      </p:ext>
+    </p:extLst>
+  </p:cSld>
+  <p:clrMapOvr>
+    <a:masterClrMapping/>
+  </p:clrMapOvr>
+  <p:timing>
+    <p:tnLst>
+      <p:par>
+        <p:cTn xmlns:p14="http://schemas.microsoft.com/office/powerpoint/2010/main" id="1" dur="indefinite" restart="never" nodeType="tmRoot"/>
+      </p:par>
+    </p:tnLst>
+  </p:timing>
+</p:sld>
+</file>
+
+<file path=ppt/slides/slide8.xml><?xml version="1.0" encoding="utf-8"?>
+<p:sld xmlns:a="http://schemas.openxmlformats.org/drawingml/2006/main" xmlns:r="http://schemas.openxmlformats.org/officeDocument/2006/relationships" xmlns:p="http://schemas.openxmlformats.org/presentationml/2006/main">
+  <p:cSld>
+    <p:spTree>
+      <p:nvGrpSpPr>
+        <p:cNvPr id="1" name=""/>
+        <p:cNvGrpSpPr/>
+        <p:nvPr/>
+      </p:nvGrpSpPr>
+      <p:grpSpPr>
+        <a:xfrm>
+          <a:off x="0" y="0"/>
+          <a:ext cx="0" cy="0"/>
+          <a:chOff x="0" y="0"/>
+          <a:chExt cx="0" cy="0"/>
+        </a:xfrm>
+      </p:grpSpPr>
+      <p:sp>
+        <p:nvSpPr>
+          <p:cNvPr id="2" name="Title 1"/>
+          <p:cNvSpPr>
+            <a:spLocks noGrp="1"/>
+          </p:cNvSpPr>
+          <p:nvPr>
+            <p:ph type="title"/>
+          </p:nvPr>
+        </p:nvSpPr>
+        <p:spPr>
+          <a:xfrm>
+            <a:off x="1" y="0"/>
+            <a:ext cx="9144000" cy="895407"/>
+          </a:xfrm>
+        </p:spPr>
+        <p:txBody>
+          <a:bodyPr>
+            <a:normAutofit/>
+          </a:bodyPr>
+          <a:lstStyle/>
+          <a:p>
+            <a:r>
+              <a:rPr lang="en-US" sz="3600" dirty="0"/>
+              <a:t>The 7 “Habits” of Highly Effective Programmers</a:t>
+            </a:r>
+          </a:p>
+        </p:txBody>
+      </p:sp>
+      <p:sp>
+        <p:nvSpPr>
+          <p:cNvPr id="3" name="Content Placeholder 2"/>
+          <p:cNvSpPr>
+            <a:spLocks noGrp="1"/>
+          </p:cNvSpPr>
+          <p:nvPr>
+            <p:ph idx="1"/>
+          </p:nvPr>
+        </p:nvSpPr>
+        <p:spPr>
+          <a:xfrm>
+            <a:off x="113969" y="895408"/>
+            <a:ext cx="9030031" cy="5835592"/>
+          </a:xfrm>
+        </p:spPr>
+        <p:txBody>
+          <a:bodyPr>
+            <a:noAutofit/>
+          </a:bodyPr>
+          <a:lstStyle/>
+          <a:p>
+            <a:pPr marL="514350" lvl="0" indent="-514350">
+              <a:buFont typeface="+mj-lt"/>
+              <a:buAutoNum type="arabicPeriod"/>
+            </a:pPr>
+            <a:r>
+              <a:rPr lang="en-US" sz="2400" b="1" dirty="0" smtClean="0"/>
+              <a:t>Variables</a:t>
+            </a:r>
+            <a:r>
+              <a:rPr lang="en-US" sz="2400" dirty="0"/>
+              <a:t>: storing </a:t>
+            </a:r>
+            <a:r>
+              <a:rPr lang="en-US" sz="2400" dirty="0" smtClean="0"/>
+              <a:t>information (numbers, text)</a:t>
+            </a:r>
+            <a:endParaRPr lang="en-US" sz="2400" dirty="0"/>
+          </a:p>
+          <a:p>
+            <a:pPr marL="514350" lvl="0" indent="-514350">
+              <a:buFont typeface="+mj-lt"/>
+              <a:buAutoNum type="arabicPeriod"/>
+            </a:pPr>
+            <a:r>
+              <a:rPr lang="en-US" sz="2400" b="1" dirty="0"/>
+              <a:t>Math &amp; Logic</a:t>
+            </a:r>
+            <a:r>
+              <a:rPr lang="en-US" sz="2400" dirty="0"/>
+              <a:t>: writing &amp; evaluating expressions</a:t>
+            </a:r>
+          </a:p>
+          <a:p>
+            <a:pPr marL="514350" lvl="0" indent="-514350">
+              <a:buFont typeface="+mj-lt"/>
+              <a:buAutoNum type="arabicPeriod"/>
+            </a:pPr>
+            <a:r>
+              <a:rPr lang="en-US" sz="2400" b="1" dirty="0" err="1"/>
+              <a:t>Input/Output</a:t>
+            </a:r>
+            <a:r>
+              <a:rPr lang="en-US" sz="2400" b="1" dirty="0"/>
+              <a:t> (IO):</a:t>
+            </a:r>
+            <a:r>
+              <a:rPr lang="en-US" sz="2400" dirty="0"/>
+              <a:t> getting information from the user (or a file/DB) and displaying information to the screen </a:t>
+            </a:r>
+            <a:r>
+              <a:rPr lang="en-US" sz="2400" dirty="0" smtClean="0"/>
+              <a:t>graphically </a:t>
+            </a:r>
+            <a:r>
+              <a:rPr lang="en-US" sz="2400" dirty="0"/>
+              <a:t>or with the console</a:t>
+            </a:r>
+          </a:p>
+          <a:p>
+            <a:pPr marL="514350" lvl="0" indent="-514350">
+              <a:buFont typeface="+mj-lt"/>
+              <a:buAutoNum type="arabicPeriod"/>
+            </a:pPr>
+            <a:r>
+              <a:rPr lang="en-US" sz="2400" b="1" dirty="0"/>
+              <a:t>Conditions</a:t>
+            </a:r>
+            <a:r>
+              <a:rPr lang="en-US" sz="2400" dirty="0"/>
+              <a:t>: changing what code statements are executed under different scenarios (i.e., if the day is Sunday, sleep in; otherwise, get up at 6 am)</a:t>
+            </a:r>
+          </a:p>
+          <a:p>
+            <a:pPr marL="514350" lvl="0" indent="-514350">
+              <a:buFont typeface="+mj-lt"/>
+              <a:buAutoNum type="arabicPeriod"/>
+            </a:pPr>
+            <a:r>
+              <a:rPr lang="en-US" sz="2400" b="1" dirty="0"/>
+              <a:t>Loops</a:t>
+            </a:r>
+            <a:r>
+              <a:rPr lang="en-US" sz="2400" dirty="0"/>
+              <a:t>: repeat code statements (e.g.: while the sink is dirty, keep scrubbing)</a:t>
+            </a:r>
+          </a:p>
+          <a:p>
+            <a:pPr marL="514350" lvl="0" indent="-514350">
+              <a:buFont typeface="+mj-lt"/>
+              <a:buAutoNum type="arabicPeriod"/>
+            </a:pPr>
+            <a:r>
+              <a:rPr lang="en-US" sz="2400" b="1" dirty="0"/>
+              <a:t>Functions</a:t>
+            </a:r>
+            <a:r>
+              <a:rPr lang="en-US" sz="2400" dirty="0"/>
+              <a:t>: grouped set of statements to accomplish a task based on parameters (e.g.: given f(x)=x+5 then f(2) would be 7)</a:t>
+            </a:r>
+          </a:p>
+          <a:p>
+            <a:pPr marL="514350" lvl="0" indent="-514350">
+              <a:buFont typeface="+mj-lt"/>
+              <a:buAutoNum type="arabicPeriod"/>
+            </a:pPr>
+            <a:r>
+              <a:rPr lang="en-US" sz="2400" b="1" dirty="0"/>
+              <a:t>Lists</a:t>
+            </a:r>
+            <a:r>
+              <a:rPr lang="en-US" sz="2400" dirty="0"/>
+              <a:t>: store multiple pieces of information (e.g.: an array that stores the integers 1-5 or the letters of the alphabet</a:t>
+            </a:r>
+            <a:r>
+              <a:rPr lang="en-US" sz="2400" dirty="0" smtClean="0"/>
+              <a:t>)</a:t>
+            </a:r>
+            <a:endParaRPr lang="en-US" sz="2400" dirty="0"/>
+          </a:p>
+        </p:txBody>
+      </p:sp>
+    </p:spTree>
+    <p:extLst>
+      <p:ext uri="{BB962C8B-B14F-4D97-AF65-F5344CB8AC3E}">
+        <p14:creationId xmlns:p14="http://schemas.microsoft.com/office/powerpoint/2010/main" val="2083047539"/>
+      </p:ext>
+    </p:extLst>
+  </p:cSld>
+  <p:clrMapOvr>
+    <a:masterClrMapping/>
+  </p:clrMapOvr>
+  <p:timing>
+    <p:tnLst>
+      <p:par>
+        <p:cTn xmlns:p14="http://schemas.microsoft.com/office/powerpoint/2010/main" id="1" dur="indefinite" restart="never" nodeType="tmRoot">
+          <p:childTnLst>
+            <p:seq concurrent="1" nextAc="seek">
+              <p:cTn id="2" dur="indefinite" nodeType="mainSeq">
+                <p:childTnLst>
+                  <p:par>
+                    <p:cTn id="3" fill="hold">
+                      <p:stCondLst>
+                        <p:cond delay="indefinite"/>
+                      </p:stCondLst>
+                      <p:childTnLst>
+                        <p:par>
+                          <p:cTn id="4" fill="hold">
+                            <p:stCondLst>
+                              <p:cond delay="0"/>
+                            </p:stCondLst>
+                            <p:childTnLst>
+                              <p:par>
+                                <p:cTn id="5" presetID="1" presetClass="entr" presetSubtype="0" fill="hold" grpId="0" nodeType="clickEffect">
+                                  <p:stCondLst>
+                                    <p:cond delay="0"/>
+                                  </p:stCondLst>
+                                  <p:childTnLst>
+                                    <p:set>
+                                      <p:cBhvr>
+                                        <p:cTn id="6" dur="1" fill="hold">
+                                          <p:stCondLst>
+                                            <p:cond delay="0"/>
+                                          </p:stCondLst>
+                                        </p:cTn>
+                                        <p:tgtEl>
+                                          <p:spTgt spid="3">
+                                            <p:txEl>
+                                              <p:pRg st="0" end="0"/>
+                                            </p:txEl>
+                                          </p:spTgt>
+                                        </p:tgtEl>
+                                        <p:attrNameLst>
+                                          <p:attrName>style.visibility</p:attrName>
+                                        </p:attrNameLst>
+                                      </p:cBhvr>
+                                      <p:to>
+                                        <p:strVal val="visible"/>
+                                      </p:to>
+                                    </p:set>
+                                  </p:childTnLst>
+                                </p:cTn>
+                              </p:par>
+                            </p:childTnLst>
+                          </p:cTn>
+                        </p:par>
+                      </p:childTnLst>
+                    </p:cTn>
+                  </p:par>
+                  <p:par>
+                    <p:cTn id="7" fill="hold">
+                      <p:stCondLst>
+                        <p:cond delay="indefinite"/>
+                      </p:stCondLst>
+                      <p:childTnLst>
+                        <p:par>
+                          <p:cTn id="8" fill="hold">
+                            <p:stCondLst>
+                              <p:cond delay="0"/>
+                            </p:stCondLst>
+                            <p:childTnLst>
+                              <p:par>
+                                <p:cTn id="9" presetID="1" presetClass="entr" presetSubtype="0" fill="hold" grpId="0" nodeType="clickEffect">
+                                  <p:stCondLst>
+                                    <p:cond delay="0"/>
+                                  </p:stCondLst>
+                                  <p:childTnLst>
+                                    <p:set>
+                                      <p:cBhvr>
+                                        <p:cTn id="10" dur="1" fill="hold">
+                                          <p:stCondLst>
+                                            <p:cond delay="0"/>
+                                          </p:stCondLst>
+                                        </p:cTn>
+                                        <p:tgtEl>
+                                          <p:spTgt spid="3">
+                                            <p:txEl>
+                                              <p:pRg st="1" end="1"/>
+                                            </p:txEl>
+                                          </p:spTgt>
+                                        </p:tgtEl>
+                                        <p:attrNameLst>
+                                          <p:attrName>style.visibility</p:attrName>
+                                        </p:attrNameLst>
+                                      </p:cBhvr>
+                                      <p:to>
+                                        <p:strVal val="visible"/>
+                                      </p:to>
+                                    </p:set>
+                                  </p:childTnLst>
+                                </p:cTn>
+                              </p:par>
+                            </p:childTnLst>
+                          </p:cTn>
+                        </p:par>
+                      </p:childTnLst>
+                    </p:cTn>
+                  </p:par>
+                  <p:par>
+                    <p:cTn id="11" fill="hold">
+                      <p:stCondLst>
+                        <p:cond delay="indefinite"/>
+                      </p:stCondLst>
+                      <p:childTnLst>
+                        <p:par>
+                          <p:cTn id="12" fill="hold">
+                            <p:stCondLst>
+                              <p:cond delay="0"/>
+                            </p:stCondLst>
+                            <p:childTnLst>
+                              <p:par>
+                                <p:cTn id="13" presetID="1" presetClass="entr" presetSubtype="0" fill="hold" grpId="0" nodeType="clickEffect">
+                                  <p:stCondLst>
+                                    <p:cond delay="0"/>
+                                  </p:stCondLst>
+                                  <p:childTnLst>
+                                    <p:set>
+                                      <p:cBhvr>
+                                        <p:cTn id="14" dur="1" fill="hold">
+                                          <p:stCondLst>
+                                            <p:cond delay="0"/>
+                                          </p:stCondLst>
+                                        </p:cTn>
+                                        <p:tgtEl>
+                                          <p:spTgt spid="3">
+                                            <p:txEl>
+                                              <p:pRg st="2" end="2"/>
+                                            </p:txEl>
+                                          </p:spTgt>
+                                        </p:tgtEl>
+                                        <p:attrNameLst>
+                                          <p:attrName>style.visibility</p:attrName>
+                                        </p:attrNameLst>
+                                      </p:cBhvr>
+                                      <p:to>
+                                        <p:strVal val="visible"/>
+                                      </p:to>
+                                    </p:set>
+                                  </p:childTnLst>
+                                </p:cTn>
+                              </p:par>
+                            </p:childTnLst>
+                          </p:cTn>
+                        </p:par>
+                      </p:childTnLst>
+                    </p:cTn>
+                  </p:par>
+                  <p:par>
+                    <p:cTn id="15" fill="hold">
+                      <p:stCondLst>
+                        <p:cond delay="indefinite"/>
+                      </p:stCondLst>
+                      <p:childTnLst>
+                        <p:par>
+                          <p:cTn id="16" fill="hold">
+                            <p:stCondLst>
+                              <p:cond delay="0"/>
+                            </p:stCondLst>
+                            <p:childTnLst>
+                              <p:par>
+                                <p:cTn id="17" presetID="1" presetClass="entr" presetSubtype="0" fill="hold" grpId="0" nodeType="clickEffect">
+                                  <p:stCondLst>
+                                    <p:cond delay="0"/>
+                                  </p:stCondLst>
+                                  <p:childTnLst>
+                                    <p:set>
+                                      <p:cBhvr>
+                                        <p:cTn id="18" dur="1" fill="hold">
+                                          <p:stCondLst>
+                                            <p:cond delay="0"/>
+                                          </p:stCondLst>
+                                        </p:cTn>
+                                        <p:tgtEl>
+                                          <p:spTgt spid="3">
+                                            <p:txEl>
+                                              <p:pRg st="3" end="3"/>
+                                            </p:txEl>
+                                          </p:spTgt>
+                                        </p:tgtEl>
+                                        <p:attrNameLst>
+                                          <p:attrName>style.visibility</p:attrName>
+                                        </p:attrNameLst>
+                                      </p:cBhvr>
+                                      <p:to>
+                                        <p:strVal val="visible"/>
+                                      </p:to>
+                                    </p:set>
+                                  </p:childTnLst>
+                                </p:cTn>
+                              </p:par>
+                            </p:childTnLst>
+                          </p:cTn>
+                        </p:par>
+                      </p:childTnLst>
+                    </p:cTn>
+                  </p:par>
+                  <p:par>
+                    <p:cTn id="19" fill="hold">
+                      <p:stCondLst>
+                        <p:cond delay="indefinite"/>
+                      </p:stCondLst>
+                      <p:childTnLst>
+                        <p:par>
+                          <p:cTn id="20" fill="hold">
+                            <p:stCondLst>
+                              <p:cond delay="0"/>
+                            </p:stCondLst>
+                            <p:childTnLst>
+                              <p:par>
+                                <p:cTn id="21" presetID="1" presetClass="entr" presetSubtype="0" fill="hold" grpId="0" nodeType="clickEffect">
+                                  <p:stCondLst>
+                                    <p:cond delay="0"/>
+                                  </p:stCondLst>
+                                  <p:childTnLst>
+                                    <p:set>
+                                      <p:cBhvr>
+                                        <p:cTn id="22" dur="1" fill="hold">
+                                          <p:stCondLst>
+                                            <p:cond delay="0"/>
+                                          </p:stCondLst>
+                                        </p:cTn>
+                                        <p:tgtEl>
+                                          <p:spTgt spid="3">
+                                            <p:txEl>
+                                              <p:pRg st="4" end="4"/>
+                                            </p:txEl>
+                                          </p:spTgt>
+                                        </p:tgtEl>
+                                        <p:attrNameLst>
+                                          <p:attrName>style.visibility</p:attrName>
+                                        </p:attrNameLst>
+                                      </p:cBhvr>
+                                      <p:to>
+                                        <p:strVal val="visible"/>
+                                      </p:to>
+                                    </p:set>
+                                  </p:childTnLst>
+                                </p:cTn>
+                              </p:par>
+                            </p:childTnLst>
+                          </p:cTn>
+                        </p:par>
+                      </p:childTnLst>
+                    </p:cTn>
+                  </p:par>
+                  <p:par>
+                    <p:cTn id="23" fill="hold">
+                      <p:stCondLst>
+                        <p:cond delay="indefinite"/>
+                      </p:stCondLst>
+                      <p:childTnLst>
+                        <p:par>
+                          <p:cTn id="24" fill="hold">
+                            <p:stCondLst>
+                              <p:cond delay="0"/>
+                            </p:stCondLst>
+                            <p:childTnLst>
+                              <p:par>
+                                <p:cTn id="25" presetID="1" presetClass="entr" presetSubtype="0" fill="hold" grpId="0" nodeType="clickEffect">
+                                  <p:stCondLst>
+                                    <p:cond delay="0"/>
+                                  </p:stCondLst>
+                                  <p:childTnLst>
+                                    <p:set>
+                                      <p:cBhvr>
+                                        <p:cTn id="26" dur="1" fill="hold">
+                                          <p:stCondLst>
+                                            <p:cond delay="0"/>
+                                          </p:stCondLst>
+                                        </p:cTn>
+                                        <p:tgtEl>
+                                          <p:spTgt spid="3">
+                                            <p:txEl>
+                                              <p:pRg st="5" end="5"/>
+                                            </p:txEl>
+                                          </p:spTgt>
+                                        </p:tgtEl>
+                                        <p:attrNameLst>
+                                          <p:attrName>style.visibility</p:attrName>
+                                        </p:attrNameLst>
+                                      </p:cBhvr>
+                                      <p:to>
+                                        <p:strVal val="visible"/>
+                                      </p:to>
+                                    </p:set>
+                                  </p:childTnLst>
+                                </p:cTn>
+                              </p:par>
+                            </p:childTnLst>
+                          </p:cTn>
+                        </p:par>
+                      </p:childTnLst>
+                    </p:cTn>
+                  </p:par>
+                  <p:par>
+                    <p:cTn id="27" fill="hold">
+                      <p:stCondLst>
+                        <p:cond delay="indefinite"/>
+                      </p:stCondLst>
+                      <p:childTnLst>
+                        <p:par>
+                          <p:cTn id="28" fill="hold">
+                            <p:stCondLst>
+                              <p:cond delay="0"/>
+                            </p:stCondLst>
+                            <p:childTnLst>
+                              <p:par>
+                                <p:cTn id="29" presetID="1" presetClass="entr" presetSubtype="0" fill="hold" grpId="0" nodeType="clickEffect">
+                                  <p:stCondLst>
+                                    <p:cond delay="0"/>
+                                  </p:stCondLst>
+                                  <p:childTnLst>
+                                    <p:set>
+                                      <p:cBhvr>
+                                        <p:cTn id="30" dur="1" fill="hold">
+                                          <p:stCondLst>
+                                            <p:cond delay="0"/>
+                                          </p:stCondLst>
+                                        </p:cTn>
+                                        <p:tgtEl>
+                                          <p:spTgt spid="3">
+                                            <p:txEl>
+                                              <p:pRg st="6" end="6"/>
+                                            </p:txEl>
+                                          </p:spTgt>
+                                        </p:tgtEl>
+                                        <p:attrNameLst>
+                                          <p:attrName>style.visibility</p:attrName>
+                                        </p:attrNameLst>
+                                      </p:cBhvr>
+                                      <p:to>
+                                        <p:strVal val="visible"/>
+                                      </p:to>
+                                    </p:set>
+                                  </p:childTnLst>
+                                </p:cTn>
+                              </p:par>
+                            </p:childTnLst>
+                          </p:cTn>
+                        </p:par>
+                      </p:childTnLst>
+                    </p:cTn>
+                  </p:par>
+                </p:childTnLst>
+              </p:cTn>
+              <p:prevCondLst>
+                <p:cond evt="onPrev" delay="0">
+                  <p:tgtEl>
+                    <p:sldTgt/>
+                  </p:tgtEl>
+                </p:cond>
+              </p:prevCondLst>
+              <p:nextCondLst>
+                <p:cond evt="onNext" delay="0">
+                  <p:tgtEl>
+                    <p:sldTgt/>
+                  </p:tgtEl>
+                </p:cond>
+              </p:nextCondLst>
+            </p:seq>
+          </p:childTnLst>
+        </p:cTn>
+      </p:par>
+    </p:tnLst>
+    <p:bldLst>
+      <p:bldP spid="3" grpId="0" build="p"/>
+    </p:bldLst>
+  </p:timing>
+</p:sld>
+</file>
+
+<file path=ppt/slides/slide9.xml><?xml version="1.0" encoding="utf-8"?>
+<p:sld xmlns:a="http://schemas.openxmlformats.org/drawingml/2006/main" xmlns:r="http://schemas.openxmlformats.org/officeDocument/2006/relationships" xmlns:p="http://schemas.openxmlformats.org/presentationml/2006/main">
+  <p:cSld>
+    <p:spTree>
+      <p:nvGrpSpPr>
+        <p:cNvPr id="1" name=""/>
+        <p:cNvGrpSpPr/>
+        <p:nvPr/>
+      </p:nvGrpSpPr>
+      <p:grpSpPr>
+        <a:xfrm>
+          <a:off x="0" y="0"/>
+          <a:ext cx="0" cy="0"/>
+          <a:chOff x="0" y="0"/>
+          <a:chExt cx="0" cy="0"/>
+        </a:xfrm>
+      </p:grpSpPr>
+      <p:sp>
+        <p:nvSpPr>
           <p:cNvPr id="3" name="Text Placeholder 2"/>
           <p:cNvSpPr>
             <a:spLocks noGrp="1"/>
@@ -7965,8 +9302,16 @@
               <a:buAutoNum type="arabicPeriod"/>
             </a:pPr>
             <a:r>
+              <a:rPr lang="en-US" dirty="0" err="1" smtClean="0"/>
+              <a:t>Input</a:t>
+            </a:r>
+            <a:r>
+              <a:rPr lang="en-US" dirty="0" err="1"/>
+              <a:t>/Output</a:t>
+            </a:r>
+            <a:r>
               <a:rPr lang="en-US" dirty="0"/>
-              <a:t>Functions</a:t>
+              <a:t> (IO)</a:t>
             </a:r>
           </a:p>
           <a:p>
@@ -7975,13 +9320,20 @@
               <a:buAutoNum type="arabicPeriod"/>
             </a:pPr>
             <a:r>
-              <a:rPr lang="en-US" dirty="0" err="1"/>
-              <a:t>Input/Output</a:t>
-            </a:r>
-            <a:r>
-              <a:rPr lang="en-US" dirty="0"/>
-              <a:t> (IO)</a:t>
-            </a:r>
+              <a:rPr lang="en-US" dirty="0" smtClean="0"/>
+              <a:t>Conditionals</a:t>
+            </a:r>
+            <a:br>
+              <a:rPr lang="en-US" dirty="0" smtClean="0"/>
+            </a:br>
+            <a:r>
+              <a:rPr lang="en-US" dirty="0" smtClean="0"/>
+              <a:t/>
+            </a:r>
+            <a:br>
+              <a:rPr lang="en-US" dirty="0" smtClean="0"/>
+            </a:br>
+            <a:endParaRPr lang="en-US" dirty="0"/>
           </a:p>
           <a:p>
             <a:pPr marL="514350" indent="-514350">
@@ -7990,14 +9342,7 @@
             </a:pPr>
             <a:r>
               <a:rPr lang="en-US" dirty="0" smtClean="0"/>
-              <a:t>Conditionals</a:t>
-            </a:r>
-            <a:br>
-              <a:rPr lang="en-US" dirty="0" smtClean="0"/>
-            </a:br>
-            <a:r>
-              <a:rPr lang="en-US" dirty="0" smtClean="0"/>
-              <a:t/>
+              <a:t>Loops</a:t>
             </a:r>
             <a:br>
               <a:rPr lang="en-US" dirty="0" smtClean="0"/>
@@ -8011,12 +9356,9 @@
             </a:pPr>
             <a:r>
               <a:rPr lang="en-US" dirty="0" smtClean="0"/>
-              <a:t>Lists</a:t>
-            </a:r>
-            <a:br>
-              <a:rPr lang="en-US" dirty="0" smtClean="0"/>
-            </a:br>
-            <a:endParaRPr lang="en-US" dirty="0" smtClean="0"/>
+              <a:t>Functions</a:t>
+            </a:r>
+            <a:endParaRPr lang="en-US" dirty="0"/>
           </a:p>
           <a:p>
             <a:pPr marL="514350" indent="-514350">
@@ -8025,16 +9367,9 @@
             </a:pPr>
             <a:r>
               <a:rPr lang="en-US" dirty="0" smtClean="0"/>
-              <a:t>Loops</a:t>
-            </a:r>
-            <a:endParaRPr lang="en-US" dirty="0"/>
-          </a:p>
-          <a:p>
-            <a:pPr marL="514350" indent="-514350">
-              <a:buFont typeface="+mj-lt"/>
-              <a:buAutoNum type="arabicPeriod"/>
-            </a:pPr>
-            <a:endParaRPr lang="en-US" dirty="0"/>
+              <a:t>Lists</a:t>
+            </a:r>
+            <a:endParaRPr lang="en-US" dirty="0" smtClean="0"/>
           </a:p>
         </p:txBody>
       </p:sp>
@@ -8061,7 +9396,7 @@
             <a:pPr algn="ctr"/>
             <a:r>
               <a:rPr lang="en-US" dirty="0" smtClean="0"/>
-              <a:t>Example</a:t>
+              <a:t>Example from Math</a:t>
             </a:r>
             <a:endParaRPr lang="en-US" dirty="0"/>
           </a:p>
@@ -8490,7 +9825,7 @@
         </p:nvSpPr>
         <p:spPr>
           <a:xfrm>
-            <a:off x="3856717" y="3026452"/>
+            <a:off x="3778326" y="5466340"/>
             <a:ext cx="5284746" cy="438803"/>
           </a:xfrm>
           <a:prstGeom prst="rect">
@@ -8690,7 +10025,7 @@
         </p:nvSpPr>
         <p:spPr>
           <a:xfrm>
-            <a:off x="3856717" y="4014058"/>
+            <a:off x="3856717" y="3543718"/>
             <a:ext cx="5284746" cy="804308"/>
           </a:xfrm>
           <a:prstGeom prst="rect">
@@ -9016,7 +10351,7 @@
         </p:nvSpPr>
         <p:spPr>
           <a:xfrm>
-            <a:off x="3856716" y="3507892"/>
+            <a:off x="3856716" y="3037552"/>
             <a:ext cx="5284746" cy="459126"/>
           </a:xfrm>
           <a:prstGeom prst="rect">
@@ -9200,7 +10535,7 @@
         </p:nvSpPr>
         <p:spPr>
           <a:xfrm>
-            <a:off x="3856716" y="5100835"/>
+            <a:off x="3856716" y="5905143"/>
             <a:ext cx="5284746" cy="804308"/>
           </a:xfrm>
           <a:prstGeom prst="rect">
@@ -9421,7 +10756,7 @@
         </p:nvSpPr>
         <p:spPr>
           <a:xfrm>
-            <a:off x="3856717" y="5910239"/>
+            <a:off x="3856716" y="4635727"/>
             <a:ext cx="5284746" cy="804308"/>
           </a:xfrm>
           <a:prstGeom prst="rect">
@@ -9969,7 +11304,7 @@
                             </p:stCondLst>
                             <p:childTnLst>
                               <p:par>
-                                <p:cTn id="25" presetID="1" presetClass="entr" presetSubtype="0" fill="hold" grpId="0" nodeType="clickEffect">
+                                <p:cTn id="25" presetID="1" presetClass="entr" presetSubtype="0" fill="hold" nodeType="clickEffect">
                                   <p:stCondLst>
                                     <p:cond delay="0"/>
                                   </p:stCondLst>
@@ -10022,7 +11357,7 @@
                                           </p:stCondLst>
                                         </p:cTn>
                                         <p:tgtEl>
-                                          <p:spTgt spid="9"/>
+                                          <p:spTgt spid="12"/>
                                         </p:tgtEl>
                                         <p:attrNameLst>
                                           <p:attrName>style.visibility</p:attrName>
@@ -10036,7 +11371,7 @@
                                       <p:cBhvr>
                                         <p:cTn id="30" dur="500"/>
                                         <p:tgtEl>
-                                          <p:spTgt spid="9"/>
+                                          <p:spTgt spid="12"/>
                                         </p:tgtEl>
                                       </p:cBhvr>
                                     </p:animEffect>
@@ -10115,7 +11450,7 @@
                                           </p:stCondLst>
                                         </p:cTn>
                                         <p:tgtEl>
-                                          <p:spTgt spid="12"/>
+                                          <p:spTgt spid="11"/>
                                         </p:tgtEl>
                                         <p:attrNameLst>
                                           <p:attrName>style.visibility</p:attrName>
@@ -10129,7 +11464,7 @@
                                       <p:cBhvr>
                                         <p:cTn id="38" dur="500"/>
                                         <p:tgtEl>
-                                          <p:spTgt spid="12"/>
+                                          <p:spTgt spid="11"/>
                                         </p:tgtEl>
                                       </p:cBhvr>
                                     </p:animEffect>
@@ -10208,7 +11543,7 @@
                                           </p:stCondLst>
                                         </p:cTn>
                                         <p:tgtEl>
-                                          <p:spTgt spid="11"/>
+                                          <p:spTgt spid="14"/>
                                         </p:tgtEl>
                                         <p:attrNameLst>
                                           <p:attrName>style.visibility</p:attrName>
@@ -10222,7 +11557,7 @@
                                       <p:cBhvr>
                                         <p:cTn id="46" dur="500"/>
                                         <p:tgtEl>
-                                          <p:spTgt spid="11"/>
+                                          <p:spTgt spid="14"/>
                                         </p:tgtEl>
                                       </p:cBhvr>
                                     </p:animEffect>
@@ -10301,7 +11636,7 @@
                                           </p:stCondLst>
                                         </p:cTn>
                                         <p:tgtEl>
-                                          <p:spTgt spid="13"/>
+                                          <p:spTgt spid="9"/>
                                         </p:tgtEl>
                                         <p:attrNameLst>
                                           <p:attrName>style.visibility</p:attrName>
@@ -10315,7 +11650,7 @@
                                       <p:cBhvr>
                                         <p:cTn id="54" dur="500"/>
                                         <p:tgtEl>
-                                          <p:spTgt spid="13"/>
+                                          <p:spTgt spid="9"/>
                                         </p:tgtEl>
                                       </p:cBhvr>
                                     </p:animEffect>
@@ -10394,7 +11729,7 @@
                                           </p:stCondLst>
                                         </p:cTn>
                                         <p:tgtEl>
-                                          <p:spTgt spid="14"/>
+                                          <p:spTgt spid="13"/>
                                         </p:tgtEl>
                                         <p:attrNameLst>
                                           <p:attrName>style.visibility</p:attrName>
@@ -10408,7 +11743,7 @@
                                       <p:cBhvr>
                                         <p:cTn id="62" dur="500"/>
                                         <p:tgtEl>
-                                          <p:spTgt spid="14"/>
+                                          <p:spTgt spid="13"/>
                                         </p:tgtEl>
                                       </p:cBhvr>
                                     </p:animEffect>
@@ -10453,1991 +11788,6 @@
       <p:bldP spid="12" grpId="0"/>
       <p:bldP spid="13" grpId="0"/>
       <p:bldP spid="14" grpId="0"/>
-    </p:bldLst>
-  </p:timing>
-</p:sld>
-</file>
-
-<file path=ppt/slides/slide8.xml><?xml version="1.0" encoding="utf-8"?>
-<p:sld xmlns:a="http://schemas.openxmlformats.org/drawingml/2006/main" xmlns:r="http://schemas.openxmlformats.org/officeDocument/2006/relationships" xmlns:p="http://schemas.openxmlformats.org/presentationml/2006/main" show="0">
-  <p:cSld>
-    <p:spTree>
-      <p:nvGrpSpPr>
-        <p:cNvPr id="1" name=""/>
-        <p:cNvGrpSpPr/>
-        <p:nvPr/>
-      </p:nvGrpSpPr>
-      <p:grpSpPr>
-        <a:xfrm>
-          <a:off x="0" y="0"/>
-          <a:ext cx="0" cy="0"/>
-          <a:chOff x="0" y="0"/>
-          <a:chExt cx="0" cy="0"/>
-        </a:xfrm>
-      </p:grpSpPr>
-      <p:sp>
-        <p:nvSpPr>
-          <p:cNvPr id="36866" name="Title 1"/>
-          <p:cNvSpPr>
-            <a:spLocks noGrp="1"/>
-          </p:cNvSpPr>
-          <p:nvPr>
-            <p:ph type="title"/>
-          </p:nvPr>
-        </p:nvSpPr>
-        <p:spPr>
-          <a:xfrm>
-            <a:off x="228600" y="0"/>
-            <a:ext cx="8686800" cy="715963"/>
-          </a:xfrm>
-        </p:spPr>
-        <p:txBody>
-          <a:bodyPr/>
-          <a:lstStyle/>
-          <a:p>
-            <a:r>
-              <a:rPr lang="en-US" sz="3600">
-                <a:latin typeface="Arial" charset="0"/>
-                <a:cs typeface="Arial" charset="0"/>
-              </a:rPr>
-              <a:t>Problem Solving 101</a:t>
-            </a:r>
-          </a:p>
-        </p:txBody>
-      </p:sp>
-      <p:sp>
-        <p:nvSpPr>
-          <p:cNvPr id="3" name="Content Placeholder 2"/>
-          <p:cNvSpPr>
-            <a:spLocks noGrp="1"/>
-          </p:cNvSpPr>
-          <p:nvPr>
-            <p:ph idx="1"/>
-          </p:nvPr>
-        </p:nvSpPr>
-        <p:spPr>
-          <a:xfrm>
-            <a:off x="228600" y="609600"/>
-            <a:ext cx="8686800" cy="6096000"/>
-          </a:xfrm>
-        </p:spPr>
-        <p:txBody>
-          <a:bodyPr/>
-          <a:lstStyle/>
-          <a:p>
-            <a:r>
-              <a:rPr lang="en-US" sz="2400" dirty="0">
-                <a:latin typeface="Arial" charset="0"/>
-                <a:cs typeface="Arial" charset="0"/>
-              </a:rPr>
-              <a:t>Fundamental capabilities of any computer or programming language:</a:t>
-            </a:r>
-          </a:p>
-          <a:p>
-            <a:pPr lvl="1"/>
-            <a:r>
-              <a:rPr lang="en-US" sz="2000" dirty="0">
-                <a:latin typeface="Arial" charset="0"/>
-                <a:ea typeface="Arial" charset="0"/>
-                <a:cs typeface="Arial" charset="0"/>
-              </a:rPr>
-              <a:t>store single values	</a:t>
-            </a:r>
-            <a:r>
-              <a:rPr lang="en-US" sz="2000" i="1" dirty="0">
-                <a:latin typeface="Times" charset="0"/>
-                <a:ea typeface="Arial" charset="0"/>
-                <a:cs typeface="Times" charset="0"/>
-              </a:rPr>
-              <a:t>x</a:t>
-            </a:r>
-            <a:r>
-              <a:rPr lang="en-US" sz="2000" dirty="0">
-                <a:latin typeface="Times" charset="0"/>
-                <a:ea typeface="Arial" charset="0"/>
-                <a:cs typeface="Times" charset="0"/>
-              </a:rPr>
-              <a:t> = 5</a:t>
-            </a:r>
-            <a:br>
-              <a:rPr lang="en-US" sz="2000" dirty="0">
-                <a:latin typeface="Times" charset="0"/>
-                <a:ea typeface="Arial" charset="0"/>
-                <a:cs typeface="Times" charset="0"/>
-              </a:rPr>
-            </a:br>
-            <a:r>
-              <a:rPr lang="en-US" sz="2000" dirty="0">
-                <a:latin typeface="Times" charset="0"/>
-                <a:ea typeface="Arial" charset="0"/>
-                <a:cs typeface="Times" charset="0"/>
-              </a:rPr>
-              <a:t>				</a:t>
-            </a:r>
-            <a:r>
-              <a:rPr lang="en-US" sz="2000" i="1" dirty="0" err="1">
-                <a:latin typeface="Times" charset="0"/>
-                <a:ea typeface="Arial" charset="0"/>
-                <a:cs typeface="Times" charset="0"/>
-              </a:rPr>
-              <a:t>hellothere</a:t>
-            </a:r>
-            <a:r>
-              <a:rPr lang="en-US" sz="2000" i="1" dirty="0">
-                <a:latin typeface="Times" charset="0"/>
-                <a:ea typeface="Arial" charset="0"/>
-                <a:cs typeface="Times" charset="0"/>
-              </a:rPr>
-              <a:t> </a:t>
-            </a:r>
-            <a:r>
-              <a:rPr lang="en-US" sz="2000" dirty="0">
-                <a:latin typeface="Times" charset="0"/>
-                <a:ea typeface="Arial" charset="0"/>
-                <a:cs typeface="Times" charset="0"/>
-              </a:rPr>
-              <a:t>= “howdy”</a:t>
-            </a:r>
-          </a:p>
-          <a:p>
-            <a:pPr lvl="1"/>
-            <a:r>
-              <a:rPr lang="en-US" sz="2000" dirty="0">
-                <a:latin typeface="Arial" charset="0"/>
-                <a:ea typeface="Arial" charset="0"/>
-                <a:cs typeface="Arial" charset="0"/>
-              </a:rPr>
-              <a:t>store lists of values	</a:t>
-            </a:r>
-            <a:r>
-              <a:rPr lang="en-US" sz="2000" i="1" dirty="0">
-                <a:latin typeface="Times" charset="0"/>
-                <a:ea typeface="Arial" charset="0"/>
-                <a:cs typeface="Times" charset="0"/>
-              </a:rPr>
-              <a:t>array </a:t>
-            </a:r>
-            <a:r>
-              <a:rPr lang="en-US" sz="2000" dirty="0">
-                <a:latin typeface="Times" charset="0"/>
-                <a:ea typeface="Arial" charset="0"/>
-                <a:cs typeface="Times" charset="0"/>
-              </a:rPr>
-              <a:t>= 1:5</a:t>
-            </a:r>
-            <a:br>
-              <a:rPr lang="en-US" sz="2000" dirty="0">
-                <a:latin typeface="Times" charset="0"/>
-                <a:ea typeface="Arial" charset="0"/>
-                <a:cs typeface="Times" charset="0"/>
-              </a:rPr>
-            </a:br>
-            <a:r>
-              <a:rPr lang="en-US" sz="2000" dirty="0">
-                <a:latin typeface="Times" charset="0"/>
-                <a:ea typeface="Arial" charset="0"/>
-                <a:cs typeface="Times" charset="0"/>
-              </a:rPr>
-              <a:t>				</a:t>
-            </a:r>
-            <a:r>
-              <a:rPr lang="en-US" sz="2000" i="1" dirty="0">
-                <a:latin typeface="Times" charset="0"/>
-                <a:ea typeface="Arial" charset="0"/>
-                <a:cs typeface="Times" charset="0"/>
-              </a:rPr>
-              <a:t>array </a:t>
-            </a:r>
-            <a:r>
-              <a:rPr lang="en-US" sz="2000" dirty="0">
-                <a:latin typeface="Times" charset="0"/>
-                <a:ea typeface="Arial" charset="0"/>
-                <a:cs typeface="Times" charset="0"/>
-              </a:rPr>
-              <a:t>= 1, 4, 7, 8</a:t>
-            </a:r>
-          </a:p>
-          <a:p>
-            <a:pPr lvl="1"/>
-            <a:r>
-              <a:rPr lang="en-US" sz="2000" dirty="0">
-                <a:latin typeface="Arial" charset="0"/>
-                <a:ea typeface="Arial" charset="0"/>
-                <a:cs typeface="Arial" charset="0"/>
-              </a:rPr>
-              <a:t>functions			</a:t>
-            </a:r>
-            <a:r>
-              <a:rPr lang="en-US" sz="2000" i="1" dirty="0">
-                <a:latin typeface="Times" charset="0"/>
-                <a:ea typeface="Arial" charset="0"/>
-                <a:cs typeface="Times" charset="0"/>
-              </a:rPr>
-              <a:t>f(x) = x</a:t>
-            </a:r>
-            <a:r>
-              <a:rPr lang="en-US" sz="2000" i="1" baseline="30000" dirty="0">
-                <a:latin typeface="Times" charset="0"/>
-                <a:ea typeface="Arial" charset="0"/>
-                <a:cs typeface="Times" charset="0"/>
-              </a:rPr>
-              <a:t>2</a:t>
-            </a:r>
-          </a:p>
-          <a:p>
-            <a:pPr lvl="1"/>
-            <a:r>
-              <a:rPr lang="en-US" sz="2000" dirty="0">
-                <a:latin typeface="Arial" charset="0"/>
-                <a:ea typeface="Arial" charset="0"/>
-                <a:cs typeface="Arial" charset="0"/>
-              </a:rPr>
-              <a:t>conditionals		</a:t>
-            </a:r>
-            <a:r>
-              <a:rPr lang="en-US" sz="2000" b="1" dirty="0">
-                <a:latin typeface="Times" charset="0"/>
-                <a:ea typeface="Arial" charset="0"/>
-                <a:cs typeface="Times" charset="0"/>
-              </a:rPr>
-              <a:t>if</a:t>
-            </a:r>
-            <a:r>
-              <a:rPr lang="en-US" sz="2000" dirty="0">
-                <a:latin typeface="Times" charset="0"/>
-                <a:ea typeface="Arial" charset="0"/>
-                <a:cs typeface="Times" charset="0"/>
-              </a:rPr>
-              <a:t> (</a:t>
-            </a:r>
-            <a:r>
-              <a:rPr lang="en-US" sz="2000" i="1" dirty="0">
-                <a:latin typeface="Times" charset="0"/>
-                <a:ea typeface="Arial" charset="0"/>
-                <a:cs typeface="Times" charset="0"/>
-              </a:rPr>
-              <a:t>x </a:t>
-            </a:r>
-            <a:r>
-              <a:rPr lang="en-US" sz="2000" dirty="0">
-                <a:latin typeface="Times" charset="0"/>
-                <a:ea typeface="Arial" charset="0"/>
-                <a:cs typeface="Times" charset="0"/>
-              </a:rPr>
-              <a:t>==</a:t>
-            </a:r>
-            <a:r>
-              <a:rPr lang="en-US" sz="2000" i="1" dirty="0">
-                <a:latin typeface="Times" charset="0"/>
-                <a:ea typeface="Arial" charset="0"/>
-                <a:cs typeface="Times" charset="0"/>
-              </a:rPr>
-              <a:t> f(x)</a:t>
-            </a:r>
-            <a:r>
-              <a:rPr lang="en-US" sz="2000" dirty="0">
-                <a:latin typeface="Times" charset="0"/>
-                <a:ea typeface="Arial" charset="0"/>
-                <a:cs typeface="Times" charset="0"/>
-              </a:rPr>
-              <a:t>)</a:t>
-            </a:r>
-            <a:br>
-              <a:rPr lang="en-US" sz="2000" dirty="0">
-                <a:latin typeface="Times" charset="0"/>
-                <a:ea typeface="Arial" charset="0"/>
-                <a:cs typeface="Times" charset="0"/>
-              </a:rPr>
-            </a:br>
-            <a:r>
-              <a:rPr lang="en-US" sz="2000" dirty="0">
-                <a:latin typeface="Times" charset="0"/>
-                <a:ea typeface="Arial" charset="0"/>
-                <a:cs typeface="Times" charset="0"/>
-              </a:rPr>
-              <a:t>				    </a:t>
-            </a:r>
-            <a:r>
-              <a:rPr lang="en-US" sz="2000" b="1" dirty="0">
-                <a:latin typeface="Times" charset="0"/>
-                <a:ea typeface="Arial" charset="0"/>
-                <a:cs typeface="Times" charset="0"/>
-              </a:rPr>
-              <a:t>then </a:t>
-            </a:r>
-            <a:r>
-              <a:rPr lang="en-US" sz="2000" dirty="0">
-                <a:latin typeface="Times" charset="0"/>
-                <a:ea typeface="Arial" charset="0"/>
-                <a:cs typeface="Times" charset="0"/>
-              </a:rPr>
-              <a:t>print “</a:t>
-            </a:r>
-            <a:r>
-              <a:rPr lang="en-US" sz="2000" i="1" dirty="0">
-                <a:latin typeface="Times" charset="0"/>
-                <a:ea typeface="Arial" charset="0"/>
-                <a:cs typeface="Times" charset="0"/>
-              </a:rPr>
-              <a:t>x</a:t>
-            </a:r>
-            <a:r>
-              <a:rPr lang="en-US" sz="2000" dirty="0">
-                <a:latin typeface="Times" charset="0"/>
-                <a:ea typeface="Arial" charset="0"/>
-                <a:cs typeface="Times" charset="0"/>
-              </a:rPr>
-              <a:t> is 0 or 1”</a:t>
-            </a:r>
-            <a:br>
-              <a:rPr lang="en-US" sz="2000" dirty="0">
-                <a:latin typeface="Times" charset="0"/>
-                <a:ea typeface="Arial" charset="0"/>
-                <a:cs typeface="Times" charset="0"/>
-              </a:rPr>
-            </a:br>
-            <a:r>
-              <a:rPr lang="en-US" sz="2000" dirty="0">
-                <a:latin typeface="Times" charset="0"/>
-                <a:ea typeface="Arial" charset="0"/>
-                <a:cs typeface="Times" charset="0"/>
-              </a:rPr>
-              <a:t>				    </a:t>
-            </a:r>
-            <a:r>
-              <a:rPr lang="en-US" sz="2000" b="1" dirty="0">
-                <a:latin typeface="Times" charset="0"/>
-                <a:ea typeface="Arial" charset="0"/>
-                <a:cs typeface="Times" charset="0"/>
-              </a:rPr>
-              <a:t>else </a:t>
-            </a:r>
-            <a:r>
-              <a:rPr lang="en-US" sz="2000" dirty="0">
-                <a:latin typeface="Times" charset="0"/>
-                <a:ea typeface="Arial" charset="0"/>
-                <a:cs typeface="Times" charset="0"/>
-              </a:rPr>
-              <a:t>print “</a:t>
-            </a:r>
-            <a:r>
-              <a:rPr lang="en-US" sz="2000" i="1" dirty="0">
-                <a:latin typeface="Times" charset="0"/>
-                <a:ea typeface="Arial" charset="0"/>
-                <a:cs typeface="Times" charset="0"/>
-              </a:rPr>
-              <a:t>x </a:t>
-            </a:r>
-            <a:r>
-              <a:rPr lang="en-US" sz="2000" dirty="0">
-                <a:latin typeface="Times" charset="0"/>
-                <a:ea typeface="Arial" charset="0"/>
-                <a:cs typeface="Times" charset="0"/>
-              </a:rPr>
-              <a:t>is not 0 or 1”</a:t>
-            </a:r>
-          </a:p>
-          <a:p>
-            <a:pPr lvl="1"/>
-            <a:r>
-              <a:rPr lang="en-US" sz="2000" dirty="0">
-                <a:latin typeface="Arial" charset="0"/>
-                <a:ea typeface="Arial" charset="0"/>
-                <a:cs typeface="Arial" charset="0"/>
-              </a:rPr>
-              <a:t>loop			</a:t>
-            </a:r>
-            <a:r>
-              <a:rPr lang="en-US" sz="2000" b="1" dirty="0" err="1">
-                <a:latin typeface="Times" charset="0"/>
-                <a:ea typeface="Arial" charset="0"/>
-                <a:cs typeface="Times" charset="0"/>
-              </a:rPr>
-              <a:t>foreach</a:t>
-            </a:r>
-            <a:r>
-              <a:rPr lang="en-US" sz="2000" b="1" dirty="0">
-                <a:latin typeface="Times" charset="0"/>
-                <a:ea typeface="Arial" charset="0"/>
-                <a:cs typeface="Times" charset="0"/>
-              </a:rPr>
-              <a:t> </a:t>
-            </a:r>
-            <a:r>
-              <a:rPr lang="en-US" sz="2000" i="1" dirty="0">
-                <a:latin typeface="Times" charset="0"/>
-                <a:ea typeface="Arial" charset="0"/>
-                <a:cs typeface="Times" charset="0"/>
-              </a:rPr>
-              <a:t>x</a:t>
-            </a:r>
-            <a:r>
-              <a:rPr lang="en-US" sz="2000" dirty="0">
-                <a:latin typeface="Times" charset="0"/>
-                <a:ea typeface="Arial" charset="0"/>
-                <a:cs typeface="Times" charset="0"/>
-              </a:rPr>
-              <a:t> </a:t>
-            </a:r>
-            <a:r>
-              <a:rPr lang="en-US" sz="2000" b="1" dirty="0">
-                <a:latin typeface="Times" charset="0"/>
-                <a:ea typeface="Arial" charset="0"/>
-                <a:cs typeface="Times" charset="0"/>
-              </a:rPr>
-              <a:t>in </a:t>
-            </a:r>
-            <a:r>
-              <a:rPr lang="en-US" sz="2000" dirty="0">
-                <a:latin typeface="Times" charset="0"/>
-                <a:ea typeface="Arial" charset="0"/>
-                <a:cs typeface="Times" charset="0"/>
-              </a:rPr>
-              <a:t>(1:5)</a:t>
-            </a:r>
-            <a:br>
-              <a:rPr lang="en-US" sz="2000" dirty="0">
-                <a:latin typeface="Times" charset="0"/>
-                <a:ea typeface="Arial" charset="0"/>
-                <a:cs typeface="Times" charset="0"/>
-              </a:rPr>
-            </a:br>
-            <a:r>
-              <a:rPr lang="en-US" sz="2000" dirty="0">
-                <a:latin typeface="Times" charset="0"/>
-                <a:ea typeface="Arial" charset="0"/>
-                <a:cs typeface="Times" charset="0"/>
-              </a:rPr>
-              <a:t>				    print </a:t>
-            </a:r>
-            <a:r>
-              <a:rPr lang="en-US" sz="2000" i="1" dirty="0">
-                <a:latin typeface="Times" charset="0"/>
-                <a:ea typeface="Arial" charset="0"/>
-                <a:cs typeface="Times" charset="0"/>
-              </a:rPr>
-              <a:t>x</a:t>
-            </a:r>
-            <a:r>
-              <a:rPr lang="en-US" sz="2000" dirty="0">
-                <a:latin typeface="Arial" charset="0"/>
-                <a:ea typeface="Arial" charset="0"/>
-                <a:cs typeface="Arial" charset="0"/>
-              </a:rPr>
-              <a:t/>
-            </a:r>
-            <a:br>
-              <a:rPr lang="en-US" sz="2000" dirty="0">
-                <a:latin typeface="Arial" charset="0"/>
-                <a:ea typeface="Arial" charset="0"/>
-                <a:cs typeface="Arial" charset="0"/>
-              </a:rPr>
-            </a:br>
-            <a:r>
-              <a:rPr lang="en-US" sz="2000" dirty="0">
-                <a:latin typeface="Arial" charset="0"/>
-                <a:ea typeface="Arial" charset="0"/>
-                <a:cs typeface="Arial" charset="0"/>
-              </a:rPr>
-              <a:t>				or</a:t>
-            </a:r>
-            <a:br>
-              <a:rPr lang="en-US" sz="2000" dirty="0">
-                <a:latin typeface="Arial" charset="0"/>
-                <a:ea typeface="Arial" charset="0"/>
-                <a:cs typeface="Arial" charset="0"/>
-              </a:rPr>
-            </a:br>
-            <a:r>
-              <a:rPr lang="en-US" sz="2000" dirty="0">
-                <a:latin typeface="Arial" charset="0"/>
-                <a:ea typeface="Arial" charset="0"/>
-                <a:cs typeface="Arial" charset="0"/>
-              </a:rPr>
-              <a:t>				</a:t>
-            </a:r>
-            <a:r>
-              <a:rPr lang="en-US" sz="2000" b="1" dirty="0" err="1">
-                <a:latin typeface="Times" charset="0"/>
-                <a:ea typeface="Arial" charset="0"/>
-                <a:cs typeface="Times" charset="0"/>
-              </a:rPr>
-              <a:t>foreach</a:t>
-            </a:r>
-            <a:r>
-              <a:rPr lang="en-US" sz="2000" b="1" dirty="0">
-                <a:latin typeface="Times" charset="0"/>
-                <a:ea typeface="Arial" charset="0"/>
-                <a:cs typeface="Times" charset="0"/>
-              </a:rPr>
-              <a:t> </a:t>
-            </a:r>
-            <a:r>
-              <a:rPr lang="en-US" sz="2000" i="1" dirty="0">
-                <a:latin typeface="Times" charset="0"/>
-                <a:ea typeface="Arial" charset="0"/>
-                <a:cs typeface="Times" charset="0"/>
-              </a:rPr>
-              <a:t>x</a:t>
-            </a:r>
-            <a:r>
-              <a:rPr lang="en-US" sz="2000" dirty="0">
-                <a:latin typeface="Times" charset="0"/>
-                <a:ea typeface="Arial" charset="0"/>
-                <a:cs typeface="Times" charset="0"/>
-              </a:rPr>
-              <a:t> </a:t>
-            </a:r>
-            <a:r>
-              <a:rPr lang="en-US" sz="2000" b="1" dirty="0">
-                <a:latin typeface="Times" charset="0"/>
-                <a:ea typeface="Arial" charset="0"/>
-                <a:cs typeface="Times" charset="0"/>
-              </a:rPr>
-              <a:t>in </a:t>
-            </a:r>
-            <a:r>
-              <a:rPr lang="en-US" sz="2000" dirty="0">
-                <a:latin typeface="Times" charset="0"/>
-                <a:ea typeface="Arial" charset="0"/>
-                <a:cs typeface="Times" charset="0"/>
-              </a:rPr>
-              <a:t>(</a:t>
-            </a:r>
-            <a:r>
-              <a:rPr lang="en-US" sz="2000" i="1" dirty="0">
-                <a:latin typeface="Times" charset="0"/>
-                <a:ea typeface="Arial" charset="0"/>
-                <a:cs typeface="Times" charset="0"/>
-              </a:rPr>
-              <a:t>array</a:t>
-            </a:r>
-            <a:r>
-              <a:rPr lang="en-US" sz="2000" dirty="0">
-                <a:latin typeface="Times" charset="0"/>
-                <a:ea typeface="Arial" charset="0"/>
-                <a:cs typeface="Times" charset="0"/>
-              </a:rPr>
-              <a:t>)</a:t>
-            </a:r>
-            <a:br>
-              <a:rPr lang="en-US" sz="2000" dirty="0">
-                <a:latin typeface="Times" charset="0"/>
-                <a:ea typeface="Arial" charset="0"/>
-                <a:cs typeface="Times" charset="0"/>
-              </a:rPr>
-            </a:br>
-            <a:r>
-              <a:rPr lang="en-US" sz="2000" dirty="0">
-                <a:latin typeface="Times" charset="0"/>
-                <a:ea typeface="Arial" charset="0"/>
-                <a:cs typeface="Times" charset="0"/>
-              </a:rPr>
-              <a:t>				    print </a:t>
-            </a:r>
-            <a:r>
-              <a:rPr lang="en-US" sz="2000" i="1" dirty="0">
-                <a:latin typeface="Times" charset="0"/>
-                <a:ea typeface="Arial" charset="0"/>
-                <a:cs typeface="Times" charset="0"/>
-              </a:rPr>
-              <a:t>x</a:t>
-            </a:r>
-          </a:p>
-          <a:p>
-            <a:r>
-              <a:rPr lang="en-US" sz="2400" dirty="0">
-                <a:latin typeface="Arial" charset="0"/>
-                <a:cs typeface="Arial" charset="0"/>
-              </a:rPr>
-              <a:t>5 principles can combine in infinitely many ways – once mastered, you can create any program ever written!</a:t>
-            </a:r>
-          </a:p>
-        </p:txBody>
-      </p:sp>
-      <p:sp>
-        <p:nvSpPr>
-          <p:cNvPr id="4" name="Footer Placeholder 3"/>
-          <p:cNvSpPr>
-            <a:spLocks noGrp="1"/>
-          </p:cNvSpPr>
-          <p:nvPr>
-            <p:ph type="ftr" sz="quarter" idx="10"/>
-          </p:nvPr>
-        </p:nvSpPr>
-        <p:spPr>
-          <a:xfrm>
-            <a:off x="6629400" y="6477000"/>
-            <a:ext cx="2286000" cy="307975"/>
-          </a:xfrm>
-        </p:spPr>
-        <p:txBody>
-          <a:bodyPr/>
-          <a:lstStyle>
-            <a:lvl1pPr>
-              <a:defRPr sz="2400" b="1">
-                <a:solidFill>
-                  <a:schemeClr val="tx1"/>
-                </a:solidFill>
-                <a:latin typeface="Times" charset="0"/>
-                <a:ea typeface="ＭＳ Ｐゴシック" charset="0"/>
-                <a:cs typeface="ＭＳ Ｐゴシック" charset="0"/>
-              </a:defRPr>
-            </a:lvl1pPr>
-            <a:lvl2pPr marL="37931725" indent="-37474525">
-              <a:defRPr sz="2400" b="1">
-                <a:solidFill>
-                  <a:schemeClr val="tx1"/>
-                </a:solidFill>
-                <a:latin typeface="Times" charset="0"/>
-                <a:ea typeface="ＭＳ Ｐゴシック" charset="0"/>
-              </a:defRPr>
-            </a:lvl2pPr>
-            <a:lvl3pPr>
-              <a:defRPr sz="2400" b="1">
-                <a:solidFill>
-                  <a:schemeClr val="tx1"/>
-                </a:solidFill>
-                <a:latin typeface="Times" charset="0"/>
-                <a:ea typeface="ＭＳ Ｐゴシック" charset="0"/>
-              </a:defRPr>
-            </a:lvl3pPr>
-            <a:lvl4pPr>
-              <a:defRPr sz="2400" b="1">
-                <a:solidFill>
-                  <a:schemeClr val="tx1"/>
-                </a:solidFill>
-                <a:latin typeface="Times" charset="0"/>
-                <a:ea typeface="ＭＳ Ｐゴシック" charset="0"/>
-              </a:defRPr>
-            </a:lvl4pPr>
-            <a:lvl5pPr>
-              <a:defRPr sz="2400" b="1">
-                <a:solidFill>
-                  <a:schemeClr val="tx1"/>
-                </a:solidFill>
-                <a:latin typeface="Times" charset="0"/>
-                <a:ea typeface="ＭＳ Ｐゴシック" charset="0"/>
-              </a:defRPr>
-            </a:lvl5pPr>
-            <a:lvl6pPr marL="457200" eaLnBrk="0" fontAlgn="base" hangingPunct="0">
-              <a:spcBef>
-                <a:spcPct val="0"/>
-              </a:spcBef>
-              <a:spcAft>
-                <a:spcPct val="0"/>
-              </a:spcAft>
-              <a:defRPr sz="2400" b="1">
-                <a:solidFill>
-                  <a:schemeClr val="tx1"/>
-                </a:solidFill>
-                <a:latin typeface="Times" charset="0"/>
-                <a:ea typeface="ＭＳ Ｐゴシック" charset="0"/>
-              </a:defRPr>
-            </a:lvl6pPr>
-            <a:lvl7pPr marL="914400" eaLnBrk="0" fontAlgn="base" hangingPunct="0">
-              <a:spcBef>
-                <a:spcPct val="0"/>
-              </a:spcBef>
-              <a:spcAft>
-                <a:spcPct val="0"/>
-              </a:spcAft>
-              <a:defRPr sz="2400" b="1">
-                <a:solidFill>
-                  <a:schemeClr val="tx1"/>
-                </a:solidFill>
-                <a:latin typeface="Times" charset="0"/>
-                <a:ea typeface="ＭＳ Ｐゴシック" charset="0"/>
-              </a:defRPr>
-            </a:lvl7pPr>
-            <a:lvl8pPr marL="1371600" eaLnBrk="0" fontAlgn="base" hangingPunct="0">
-              <a:spcBef>
-                <a:spcPct val="0"/>
-              </a:spcBef>
-              <a:spcAft>
-                <a:spcPct val="0"/>
-              </a:spcAft>
-              <a:defRPr sz="2400" b="1">
-                <a:solidFill>
-                  <a:schemeClr val="tx1"/>
-                </a:solidFill>
-                <a:latin typeface="Times" charset="0"/>
-                <a:ea typeface="ＭＳ Ｐゴシック" charset="0"/>
-              </a:defRPr>
-            </a:lvl8pPr>
-            <a:lvl9pPr marL="1828800" eaLnBrk="0" fontAlgn="base" hangingPunct="0">
-              <a:spcBef>
-                <a:spcPct val="0"/>
-              </a:spcBef>
-              <a:spcAft>
-                <a:spcPct val="0"/>
-              </a:spcAft>
-              <a:defRPr sz="2400" b="1">
-                <a:solidFill>
-                  <a:schemeClr val="tx1"/>
-                </a:solidFill>
-                <a:latin typeface="Times" charset="0"/>
-                <a:ea typeface="ＭＳ Ｐゴシック" charset="0"/>
-              </a:defRPr>
-            </a:lvl9pPr>
-          </a:lstStyle>
-          <a:p>
-            <a:r>
-              <a:rPr lang="en-GB" sz="1100">
-                <a:latin typeface="Arial" charset="0"/>
-                <a:cs typeface="Arial" charset="0"/>
-              </a:rPr>
-              <a:t>Created by Emily Hill</a:t>
-            </a:r>
-          </a:p>
-        </p:txBody>
-      </p:sp>
-    </p:spTree>
-    <p:extLst>
-      <p:ext uri="{BB962C8B-B14F-4D97-AF65-F5344CB8AC3E}">
-        <p14:creationId xmlns:p14="http://schemas.microsoft.com/office/powerpoint/2010/main" val="3341410881"/>
-      </p:ext>
-    </p:extLst>
-  </p:cSld>
-  <p:clrMapOvr>
-    <a:masterClrMapping/>
-  </p:clrMapOvr>
-  <p:transition xmlns:p14="http://schemas.microsoft.com/office/powerpoint/2010/main" spd="med"/>
-  <p:timing>
-    <p:tnLst>
-      <p:par>
-        <p:cTn xmlns:p14="http://schemas.microsoft.com/office/powerpoint/2010/main" id="1" dur="indefinite" restart="never" nodeType="tmRoot">
-          <p:childTnLst>
-            <p:seq concurrent="1" nextAc="seek">
-              <p:cTn id="2" dur="indefinite" nodeType="mainSeq">
-                <p:childTnLst>
-                  <p:par>
-                    <p:cTn id="3" fill="hold" nodeType="clickPar">
-                      <p:stCondLst>
-                        <p:cond delay="indefinite"/>
-                        <p:cond evt="onBegin" delay="0">
-                          <p:tn val="2"/>
-                        </p:cond>
-                      </p:stCondLst>
-                      <p:childTnLst>
-                        <p:par>
-                          <p:cTn id="4" fill="hold" nodeType="withGroup">
-                            <p:stCondLst>
-                              <p:cond delay="0"/>
-                            </p:stCondLst>
-                            <p:childTnLst>
-                              <p:par>
-                                <p:cTn id="5" presetID="1" presetClass="entr" presetSubtype="0" fill="hold" grpId="0" nodeType="withEffect">
-                                  <p:stCondLst>
-                                    <p:cond delay="0"/>
-                                  </p:stCondLst>
-                                  <p:childTnLst>
-                                    <p:set>
-                                      <p:cBhvr>
-                                        <p:cTn id="6" dur="1" fill="hold">
-                                          <p:stCondLst>
-                                            <p:cond delay="0"/>
-                                          </p:stCondLst>
-                                        </p:cTn>
-                                        <p:tgtEl>
-                                          <p:spTgt spid="3">
-                                            <p:txEl>
-                                              <p:pRg st="0" end="0"/>
-                                            </p:txEl>
-                                          </p:spTgt>
-                                        </p:tgtEl>
-                                        <p:attrNameLst>
-                                          <p:attrName>style.visibility</p:attrName>
-                                        </p:attrNameLst>
-                                      </p:cBhvr>
-                                      <p:to>
-                                        <p:strVal val="visible"/>
-                                      </p:to>
-                                    </p:set>
-                                  </p:childTnLst>
-                                </p:cTn>
-                              </p:par>
-                            </p:childTnLst>
-                          </p:cTn>
-                        </p:par>
-                      </p:childTnLst>
-                    </p:cTn>
-                  </p:par>
-                  <p:par>
-                    <p:cTn id="7" fill="hold" nodeType="clickPar">
-                      <p:stCondLst>
-                        <p:cond delay="indefinite"/>
-                      </p:stCondLst>
-                      <p:childTnLst>
-                        <p:par>
-                          <p:cTn id="8" fill="hold" nodeType="withGroup">
-                            <p:stCondLst>
-                              <p:cond delay="0"/>
-                            </p:stCondLst>
-                            <p:childTnLst>
-                              <p:par>
-                                <p:cTn id="9" presetID="1" presetClass="entr" presetSubtype="0" fill="hold" grpId="0" nodeType="clickEffect">
-                                  <p:stCondLst>
-                                    <p:cond delay="0"/>
-                                  </p:stCondLst>
-                                  <p:childTnLst>
-                                    <p:set>
-                                      <p:cBhvr>
-                                        <p:cTn id="10" dur="1" fill="hold">
-                                          <p:stCondLst>
-                                            <p:cond delay="0"/>
-                                          </p:stCondLst>
-                                        </p:cTn>
-                                        <p:tgtEl>
-                                          <p:spTgt spid="3">
-                                            <p:txEl>
-                                              <p:pRg st="1" end="1"/>
-                                            </p:txEl>
-                                          </p:spTgt>
-                                        </p:tgtEl>
-                                        <p:attrNameLst>
-                                          <p:attrName>style.visibility</p:attrName>
-                                        </p:attrNameLst>
-                                      </p:cBhvr>
-                                      <p:to>
-                                        <p:strVal val="visible"/>
-                                      </p:to>
-                                    </p:set>
-                                  </p:childTnLst>
-                                </p:cTn>
-                              </p:par>
-                            </p:childTnLst>
-                          </p:cTn>
-                        </p:par>
-                      </p:childTnLst>
-                    </p:cTn>
-                  </p:par>
-                  <p:par>
-                    <p:cTn id="11" fill="hold" nodeType="clickPar">
-                      <p:stCondLst>
-                        <p:cond delay="indefinite"/>
-                      </p:stCondLst>
-                      <p:childTnLst>
-                        <p:par>
-                          <p:cTn id="12" fill="hold" nodeType="withGroup">
-                            <p:stCondLst>
-                              <p:cond delay="0"/>
-                            </p:stCondLst>
-                            <p:childTnLst>
-                              <p:par>
-                                <p:cTn id="13" presetID="1" presetClass="entr" presetSubtype="0" fill="hold" grpId="0" nodeType="clickEffect">
-                                  <p:stCondLst>
-                                    <p:cond delay="0"/>
-                                  </p:stCondLst>
-                                  <p:childTnLst>
-                                    <p:set>
-                                      <p:cBhvr>
-                                        <p:cTn id="14" dur="1" fill="hold">
-                                          <p:stCondLst>
-                                            <p:cond delay="0"/>
-                                          </p:stCondLst>
-                                        </p:cTn>
-                                        <p:tgtEl>
-                                          <p:spTgt spid="3">
-                                            <p:txEl>
-                                              <p:pRg st="2" end="2"/>
-                                            </p:txEl>
-                                          </p:spTgt>
-                                        </p:tgtEl>
-                                        <p:attrNameLst>
-                                          <p:attrName>style.visibility</p:attrName>
-                                        </p:attrNameLst>
-                                      </p:cBhvr>
-                                      <p:to>
-                                        <p:strVal val="visible"/>
-                                      </p:to>
-                                    </p:set>
-                                  </p:childTnLst>
-                                </p:cTn>
-                              </p:par>
-                            </p:childTnLst>
-                          </p:cTn>
-                        </p:par>
-                      </p:childTnLst>
-                    </p:cTn>
-                  </p:par>
-                  <p:par>
-                    <p:cTn id="15" fill="hold" nodeType="clickPar">
-                      <p:stCondLst>
-                        <p:cond delay="indefinite"/>
-                      </p:stCondLst>
-                      <p:childTnLst>
-                        <p:par>
-                          <p:cTn id="16" fill="hold" nodeType="withGroup">
-                            <p:stCondLst>
-                              <p:cond delay="0"/>
-                            </p:stCondLst>
-                            <p:childTnLst>
-                              <p:par>
-                                <p:cTn id="17" presetID="1" presetClass="entr" presetSubtype="0" fill="hold" grpId="0" nodeType="clickEffect">
-                                  <p:stCondLst>
-                                    <p:cond delay="0"/>
-                                  </p:stCondLst>
-                                  <p:childTnLst>
-                                    <p:set>
-                                      <p:cBhvr>
-                                        <p:cTn id="18" dur="1" fill="hold">
-                                          <p:stCondLst>
-                                            <p:cond delay="0"/>
-                                          </p:stCondLst>
-                                        </p:cTn>
-                                        <p:tgtEl>
-                                          <p:spTgt spid="3">
-                                            <p:txEl>
-                                              <p:pRg st="3" end="3"/>
-                                            </p:txEl>
-                                          </p:spTgt>
-                                        </p:tgtEl>
-                                        <p:attrNameLst>
-                                          <p:attrName>style.visibility</p:attrName>
-                                        </p:attrNameLst>
-                                      </p:cBhvr>
-                                      <p:to>
-                                        <p:strVal val="visible"/>
-                                      </p:to>
-                                    </p:set>
-                                  </p:childTnLst>
-                                </p:cTn>
-                              </p:par>
-                            </p:childTnLst>
-                          </p:cTn>
-                        </p:par>
-                      </p:childTnLst>
-                    </p:cTn>
-                  </p:par>
-                  <p:par>
-                    <p:cTn id="19" fill="hold" nodeType="clickPar">
-                      <p:stCondLst>
-                        <p:cond delay="indefinite"/>
-                      </p:stCondLst>
-                      <p:childTnLst>
-                        <p:par>
-                          <p:cTn id="20" fill="hold" nodeType="withGroup">
-                            <p:stCondLst>
-                              <p:cond delay="0"/>
-                            </p:stCondLst>
-                            <p:childTnLst>
-                              <p:par>
-                                <p:cTn id="21" presetID="1" presetClass="entr" presetSubtype="0" fill="hold" grpId="0" nodeType="clickEffect">
-                                  <p:stCondLst>
-                                    <p:cond delay="0"/>
-                                  </p:stCondLst>
-                                  <p:childTnLst>
-                                    <p:set>
-                                      <p:cBhvr>
-                                        <p:cTn id="22" dur="1" fill="hold">
-                                          <p:stCondLst>
-                                            <p:cond delay="0"/>
-                                          </p:stCondLst>
-                                        </p:cTn>
-                                        <p:tgtEl>
-                                          <p:spTgt spid="3">
-                                            <p:txEl>
-                                              <p:pRg st="4" end="4"/>
-                                            </p:txEl>
-                                          </p:spTgt>
-                                        </p:tgtEl>
-                                        <p:attrNameLst>
-                                          <p:attrName>style.visibility</p:attrName>
-                                        </p:attrNameLst>
-                                      </p:cBhvr>
-                                      <p:to>
-                                        <p:strVal val="visible"/>
-                                      </p:to>
-                                    </p:set>
-                                  </p:childTnLst>
-                                </p:cTn>
-                              </p:par>
-                            </p:childTnLst>
-                          </p:cTn>
-                        </p:par>
-                      </p:childTnLst>
-                    </p:cTn>
-                  </p:par>
-                  <p:par>
-                    <p:cTn id="23" fill="hold" nodeType="clickPar">
-                      <p:stCondLst>
-                        <p:cond delay="indefinite"/>
-                      </p:stCondLst>
-                      <p:childTnLst>
-                        <p:par>
-                          <p:cTn id="24" fill="hold" nodeType="withGroup">
-                            <p:stCondLst>
-                              <p:cond delay="0"/>
-                            </p:stCondLst>
-                            <p:childTnLst>
-                              <p:par>
-                                <p:cTn id="25" presetID="1" presetClass="entr" presetSubtype="0" fill="hold" grpId="0" nodeType="clickEffect">
-                                  <p:stCondLst>
-                                    <p:cond delay="0"/>
-                                  </p:stCondLst>
-                                  <p:childTnLst>
-                                    <p:set>
-                                      <p:cBhvr>
-                                        <p:cTn id="26" dur="1" fill="hold">
-                                          <p:stCondLst>
-                                            <p:cond delay="0"/>
-                                          </p:stCondLst>
-                                        </p:cTn>
-                                        <p:tgtEl>
-                                          <p:spTgt spid="3">
-                                            <p:txEl>
-                                              <p:pRg st="5" end="5"/>
-                                            </p:txEl>
-                                          </p:spTgt>
-                                        </p:tgtEl>
-                                        <p:attrNameLst>
-                                          <p:attrName>style.visibility</p:attrName>
-                                        </p:attrNameLst>
-                                      </p:cBhvr>
-                                      <p:to>
-                                        <p:strVal val="visible"/>
-                                      </p:to>
-                                    </p:set>
-                                  </p:childTnLst>
-                                </p:cTn>
-                              </p:par>
-                            </p:childTnLst>
-                          </p:cTn>
-                        </p:par>
-                      </p:childTnLst>
-                    </p:cTn>
-                  </p:par>
-                  <p:par>
-                    <p:cTn id="27" fill="hold" nodeType="clickPar">
-                      <p:stCondLst>
-                        <p:cond delay="indefinite"/>
-                      </p:stCondLst>
-                      <p:childTnLst>
-                        <p:par>
-                          <p:cTn id="28" fill="hold" nodeType="withGroup">
-                            <p:stCondLst>
-                              <p:cond delay="0"/>
-                            </p:stCondLst>
-                            <p:childTnLst>
-                              <p:par>
-                                <p:cTn id="29" presetID="1" presetClass="entr" presetSubtype="0" fill="hold" grpId="0" nodeType="clickEffect">
-                                  <p:stCondLst>
-                                    <p:cond delay="0"/>
-                                  </p:stCondLst>
-                                  <p:childTnLst>
-                                    <p:set>
-                                      <p:cBhvr>
-                                        <p:cTn id="30" dur="1" fill="hold">
-                                          <p:stCondLst>
-                                            <p:cond delay="0"/>
-                                          </p:stCondLst>
-                                        </p:cTn>
-                                        <p:tgtEl>
-                                          <p:spTgt spid="3">
-                                            <p:txEl>
-                                              <p:pRg st="6" end="6"/>
-                                            </p:txEl>
-                                          </p:spTgt>
-                                        </p:tgtEl>
-                                        <p:attrNameLst>
-                                          <p:attrName>style.visibility</p:attrName>
-                                        </p:attrNameLst>
-                                      </p:cBhvr>
-                                      <p:to>
-                                        <p:strVal val="visible"/>
-                                      </p:to>
-                                    </p:set>
-                                  </p:childTnLst>
-                                </p:cTn>
-                              </p:par>
-                            </p:childTnLst>
-                          </p:cTn>
-                        </p:par>
-                      </p:childTnLst>
-                    </p:cTn>
-                  </p:par>
-                </p:childTnLst>
-              </p:cTn>
-              <p:prevCondLst>
-                <p:cond evt="onPrev" delay="0">
-                  <p:tgtEl>
-                    <p:sldTgt/>
-                  </p:tgtEl>
-                </p:cond>
-              </p:prevCondLst>
-              <p:nextCondLst>
-                <p:cond evt="onNext" delay="0">
-                  <p:tgtEl>
-                    <p:sldTgt/>
-                  </p:tgtEl>
-                </p:cond>
-              </p:nextCondLst>
-            </p:seq>
-          </p:childTnLst>
-        </p:cTn>
-      </p:par>
-    </p:tnLst>
-    <p:bldLst>
-      <p:bldP spid="3" grpId="0" build="p"/>
-    </p:bldLst>
-  </p:timing>
-</p:sld>
-</file>
-
-<file path=ppt/slides/slide9.xml><?xml version="1.0" encoding="utf-8"?>
-<p:sld xmlns:a="http://schemas.openxmlformats.org/drawingml/2006/main" xmlns:r="http://schemas.openxmlformats.org/officeDocument/2006/relationships" xmlns:p="http://schemas.openxmlformats.org/presentationml/2006/main" show="0">
-  <p:cSld>
-    <p:spTree>
-      <p:nvGrpSpPr>
-        <p:cNvPr id="1" name=""/>
-        <p:cNvGrpSpPr/>
-        <p:nvPr/>
-      </p:nvGrpSpPr>
-      <p:grpSpPr>
-        <a:xfrm>
-          <a:off x="0" y="0"/>
-          <a:ext cx="0" cy="0"/>
-          <a:chOff x="0" y="0"/>
-          <a:chExt cx="0" cy="0"/>
-        </a:xfrm>
-      </p:grpSpPr>
-      <p:sp>
-        <p:nvSpPr>
-          <p:cNvPr id="37890" name="Title 1"/>
-          <p:cNvSpPr>
-            <a:spLocks noGrp="1"/>
-          </p:cNvSpPr>
-          <p:nvPr>
-            <p:ph type="title"/>
-          </p:nvPr>
-        </p:nvSpPr>
-        <p:spPr/>
-        <p:txBody>
-          <a:bodyPr/>
-          <a:lstStyle/>
-          <a:p>
-            <a:r>
-              <a:rPr lang="en-US" dirty="0">
-                <a:latin typeface="+mn-lt"/>
-                <a:cs typeface="Arial" charset="0"/>
-              </a:rPr>
-              <a:t>Give it a try…</a:t>
-            </a:r>
-          </a:p>
-        </p:txBody>
-      </p:sp>
-      <p:sp>
-        <p:nvSpPr>
-          <p:cNvPr id="35843" name="Content Placeholder 2"/>
-          <p:cNvSpPr>
-            <a:spLocks noGrp="1"/>
-          </p:cNvSpPr>
-          <p:nvPr>
-            <p:ph idx="1"/>
-          </p:nvPr>
-        </p:nvSpPr>
-        <p:spPr>
-          <a:xfrm>
-            <a:off x="228600" y="1295400"/>
-            <a:ext cx="8686800" cy="5105400"/>
-          </a:xfrm>
-        </p:spPr>
-        <p:txBody>
-          <a:bodyPr>
-            <a:normAutofit fontScale="92500" lnSpcReduction="10000"/>
-          </a:bodyPr>
-          <a:lstStyle/>
-          <a:p>
-            <a:pPr>
-              <a:spcAft>
-                <a:spcPts val="1200"/>
-              </a:spcAft>
-            </a:pPr>
-            <a:r>
-              <a:rPr lang="en-US" b="1" dirty="0">
-                <a:cs typeface="Arial" charset="0"/>
-              </a:rPr>
-              <a:t>Problem</a:t>
-            </a:r>
-            <a:r>
-              <a:rPr lang="en-US" dirty="0">
-                <a:cs typeface="Arial" charset="0"/>
-              </a:rPr>
-              <a:t>: sum all the even numbers from 1 to 10</a:t>
-            </a:r>
-          </a:p>
-          <a:p>
-            <a:pPr>
-              <a:spcAft>
-                <a:spcPts val="1200"/>
-              </a:spcAft>
-            </a:pPr>
-            <a:r>
-              <a:rPr lang="en-US" dirty="0">
-                <a:cs typeface="Arial" charset="0"/>
-              </a:rPr>
-              <a:t>Use the </a:t>
-            </a:r>
-            <a:r>
-              <a:rPr lang="en-US" dirty="0" smtClean="0">
-                <a:cs typeface="Arial" charset="0"/>
-              </a:rPr>
-              <a:t>7 </a:t>
-            </a:r>
-            <a:r>
-              <a:rPr lang="en-US" dirty="0">
-                <a:cs typeface="Arial" charset="0"/>
-              </a:rPr>
-              <a:t>principles </a:t>
-            </a:r>
-            <a:r>
-              <a:rPr lang="en-US" dirty="0" smtClean="0">
-                <a:cs typeface="Arial" charset="0"/>
-              </a:rPr>
-              <a:t>to </a:t>
-            </a:r>
-            <a:r>
-              <a:rPr lang="en-US" dirty="0">
-                <a:cs typeface="Arial" charset="0"/>
-              </a:rPr>
-              <a:t>solve</a:t>
-            </a:r>
-          </a:p>
-          <a:p>
-            <a:pPr>
-              <a:spcAft>
-                <a:spcPts val="1200"/>
-              </a:spcAft>
-            </a:pPr>
-            <a:r>
-              <a:rPr lang="en-US" dirty="0">
-                <a:cs typeface="Arial" charset="0"/>
-              </a:rPr>
-              <a:t>Assume the following function is already defined:</a:t>
-            </a:r>
-            <a:br>
-              <a:rPr lang="en-US" dirty="0">
-                <a:cs typeface="Arial" charset="0"/>
-              </a:rPr>
-            </a:br>
-            <a:r>
-              <a:rPr lang="en-US" dirty="0">
-                <a:cs typeface="Arial" charset="0"/>
-              </a:rPr>
-              <a:t>					</a:t>
-            </a:r>
-            <a:r>
-              <a:rPr lang="en-US" dirty="0" smtClean="0">
-                <a:cs typeface="Arial" charset="0"/>
-              </a:rPr>
-              <a:t>					</a:t>
-            </a:r>
-            <a:r>
-              <a:rPr lang="en-US" sz="2400" dirty="0" smtClean="0">
-                <a:cs typeface="Times" charset="0"/>
-              </a:rPr>
-              <a:t>1 </a:t>
-            </a:r>
-            <a:r>
-              <a:rPr lang="en-US" sz="2400" dirty="0">
-                <a:cs typeface="Times" charset="0"/>
-              </a:rPr>
-              <a:t>if </a:t>
-            </a:r>
-            <a:r>
-              <a:rPr lang="en-US" sz="2400" i="1" dirty="0">
-                <a:cs typeface="Times" charset="0"/>
-              </a:rPr>
-              <a:t>x</a:t>
-            </a:r>
-            <a:r>
-              <a:rPr lang="en-US" sz="2400" dirty="0">
-                <a:cs typeface="Times" charset="0"/>
-              </a:rPr>
-              <a:t> is even</a:t>
-            </a:r>
-            <a:br>
-              <a:rPr lang="en-US" sz="2400" dirty="0">
-                <a:cs typeface="Times" charset="0"/>
-              </a:rPr>
-            </a:br>
-            <a:r>
-              <a:rPr lang="en-US" sz="2400" dirty="0">
-                <a:cs typeface="Times" charset="0"/>
-              </a:rPr>
-              <a:t>					</a:t>
-            </a:r>
-            <a:r>
-              <a:rPr lang="en-US" sz="2400" dirty="0" smtClean="0">
-                <a:cs typeface="Times" charset="0"/>
-              </a:rPr>
-              <a:t>					0 </a:t>
-            </a:r>
-            <a:r>
-              <a:rPr lang="en-US" sz="2400" dirty="0">
-                <a:cs typeface="Times" charset="0"/>
-              </a:rPr>
-              <a:t>otherwise</a:t>
-            </a:r>
-          </a:p>
-          <a:p>
-            <a:pPr>
-              <a:spcAft>
-                <a:spcPts val="1200"/>
-              </a:spcAft>
-            </a:pPr>
-            <a:r>
-              <a:rPr lang="en-US" u="sng" dirty="0">
-                <a:cs typeface="Arial" charset="0"/>
-              </a:rPr>
-              <a:t>Hint</a:t>
-            </a:r>
-            <a:r>
-              <a:rPr lang="en-US" dirty="0">
-                <a:cs typeface="Arial" charset="0"/>
-              </a:rPr>
-              <a:t>: you may find it helpful to build your solution </a:t>
-            </a:r>
-            <a:r>
-              <a:rPr lang="en-US" b="1" i="1" dirty="0">
-                <a:cs typeface="Arial" charset="0"/>
-              </a:rPr>
-              <a:t>incrementally</a:t>
-            </a:r>
-            <a:r>
-              <a:rPr lang="en-US" dirty="0">
-                <a:cs typeface="Arial" charset="0"/>
-              </a:rPr>
-              <a:t>:</a:t>
-            </a:r>
-          </a:p>
-          <a:p>
-            <a:pPr lvl="1"/>
-            <a:r>
-              <a:rPr lang="en-US" dirty="0">
-                <a:ea typeface="Arial" charset="0"/>
-                <a:cs typeface="Arial" charset="0"/>
-              </a:rPr>
-              <a:t>Step 1: print out the numbers from 1 to 10</a:t>
-            </a:r>
-          </a:p>
-          <a:p>
-            <a:pPr lvl="1"/>
-            <a:r>
-              <a:rPr lang="en-US" dirty="0">
-                <a:ea typeface="Arial" charset="0"/>
-                <a:cs typeface="Arial" charset="0"/>
-              </a:rPr>
-              <a:t>Step 2: print out the even numbers from 1 to 10</a:t>
-            </a:r>
-          </a:p>
-          <a:p>
-            <a:pPr lvl="1"/>
-            <a:r>
-              <a:rPr lang="en-US" dirty="0">
-                <a:ea typeface="Arial" charset="0"/>
-                <a:cs typeface="Arial" charset="0"/>
-              </a:rPr>
-              <a:t>Step 3: sum the even numbers from 1 to 10</a:t>
-            </a:r>
-          </a:p>
-        </p:txBody>
-      </p:sp>
-      <p:sp>
-        <p:nvSpPr>
-          <p:cNvPr id="35846" name="TextBox 5"/>
-          <p:cNvSpPr txBox="1">
-            <a:spLocks noChangeArrowheads="1"/>
-          </p:cNvSpPr>
-          <p:nvPr/>
-        </p:nvSpPr>
-        <p:spPr bwMode="auto">
-          <a:xfrm>
-            <a:off x="2667000" y="3200400"/>
-            <a:ext cx="1873250" cy="523875"/>
-          </a:xfrm>
-          <a:prstGeom prst="rect">
-            <a:avLst/>
-          </a:prstGeom>
-          <a:noFill/>
-          <a:ln>
-            <a:noFill/>
-          </a:ln>
-          <a:extLst>
-            <a:ext uri="{909E8E84-426E-40dd-AFC4-6F175D3DCCD1}">
-              <a14:hiddenFill xmlns:a14="http://schemas.microsoft.com/office/drawing/2010/main">
-                <a:solidFill>
-                  <a:srgbClr val="FFFFFF"/>
-                </a:solidFill>
-              </a14:hiddenFill>
-            </a:ext>
-            <a:ext uri="{91240B29-F687-4f45-9708-019B960494DF}">
-              <a14:hiddenLine xmlns:a14="http://schemas.microsoft.com/office/drawing/2010/main" w="9525">
-                <a:solidFill>
-                  <a:srgbClr val="000000"/>
-                </a:solidFill>
-                <a:miter lim="800000"/>
-                <a:headEnd/>
-                <a:tailEnd/>
-              </a14:hiddenLine>
-            </a:ext>
-          </a:extLst>
-        </p:spPr>
-        <p:txBody>
-          <a:bodyPr wrap="none">
-            <a:spAutoFit/>
-          </a:bodyPr>
-          <a:lstStyle>
-            <a:lvl1pPr>
-              <a:defRPr sz="2400" b="1">
-                <a:solidFill>
-                  <a:schemeClr val="tx1"/>
-                </a:solidFill>
-                <a:latin typeface="Times" charset="0"/>
-                <a:ea typeface="ＭＳ Ｐゴシック" charset="0"/>
-                <a:cs typeface="ＭＳ Ｐゴシック" charset="0"/>
-              </a:defRPr>
-            </a:lvl1pPr>
-            <a:lvl2pPr marL="37931725" indent="-37474525">
-              <a:defRPr sz="2400" b="1">
-                <a:solidFill>
-                  <a:schemeClr val="tx1"/>
-                </a:solidFill>
-                <a:latin typeface="Times" charset="0"/>
-                <a:ea typeface="ＭＳ Ｐゴシック" charset="0"/>
-              </a:defRPr>
-            </a:lvl2pPr>
-            <a:lvl3pPr>
-              <a:defRPr sz="2400" b="1">
-                <a:solidFill>
-                  <a:schemeClr val="tx1"/>
-                </a:solidFill>
-                <a:latin typeface="Times" charset="0"/>
-                <a:ea typeface="ＭＳ Ｐゴシック" charset="0"/>
-              </a:defRPr>
-            </a:lvl3pPr>
-            <a:lvl4pPr>
-              <a:defRPr sz="2400" b="1">
-                <a:solidFill>
-                  <a:schemeClr val="tx1"/>
-                </a:solidFill>
-                <a:latin typeface="Times" charset="0"/>
-                <a:ea typeface="ＭＳ Ｐゴシック" charset="0"/>
-              </a:defRPr>
-            </a:lvl4pPr>
-            <a:lvl5pPr>
-              <a:defRPr sz="2400" b="1">
-                <a:solidFill>
-                  <a:schemeClr val="tx1"/>
-                </a:solidFill>
-                <a:latin typeface="Times" charset="0"/>
-                <a:ea typeface="ＭＳ Ｐゴシック" charset="0"/>
-              </a:defRPr>
-            </a:lvl5pPr>
-            <a:lvl6pPr marL="457200" eaLnBrk="0" fontAlgn="base" hangingPunct="0">
-              <a:spcBef>
-                <a:spcPct val="0"/>
-              </a:spcBef>
-              <a:spcAft>
-                <a:spcPct val="0"/>
-              </a:spcAft>
-              <a:defRPr sz="2400" b="1">
-                <a:solidFill>
-                  <a:schemeClr val="tx1"/>
-                </a:solidFill>
-                <a:latin typeface="Times" charset="0"/>
-                <a:ea typeface="ＭＳ Ｐゴシック" charset="0"/>
-              </a:defRPr>
-            </a:lvl6pPr>
-            <a:lvl7pPr marL="914400" eaLnBrk="0" fontAlgn="base" hangingPunct="0">
-              <a:spcBef>
-                <a:spcPct val="0"/>
-              </a:spcBef>
-              <a:spcAft>
-                <a:spcPct val="0"/>
-              </a:spcAft>
-              <a:defRPr sz="2400" b="1">
-                <a:solidFill>
-                  <a:schemeClr val="tx1"/>
-                </a:solidFill>
-                <a:latin typeface="Times" charset="0"/>
-                <a:ea typeface="ＭＳ Ｐゴシック" charset="0"/>
-              </a:defRPr>
-            </a:lvl7pPr>
-            <a:lvl8pPr marL="1371600" eaLnBrk="0" fontAlgn="base" hangingPunct="0">
-              <a:spcBef>
-                <a:spcPct val="0"/>
-              </a:spcBef>
-              <a:spcAft>
-                <a:spcPct val="0"/>
-              </a:spcAft>
-              <a:defRPr sz="2400" b="1">
-                <a:solidFill>
-                  <a:schemeClr val="tx1"/>
-                </a:solidFill>
-                <a:latin typeface="Times" charset="0"/>
-                <a:ea typeface="ＭＳ Ｐゴシック" charset="0"/>
-              </a:defRPr>
-            </a:lvl8pPr>
-            <a:lvl9pPr marL="1828800" eaLnBrk="0" fontAlgn="base" hangingPunct="0">
-              <a:spcBef>
-                <a:spcPct val="0"/>
-              </a:spcBef>
-              <a:spcAft>
-                <a:spcPct val="0"/>
-              </a:spcAft>
-              <a:defRPr sz="2400" b="1">
-                <a:solidFill>
-                  <a:schemeClr val="tx1"/>
-                </a:solidFill>
-                <a:latin typeface="Times" charset="0"/>
-                <a:ea typeface="ＭＳ Ｐゴシック" charset="0"/>
-              </a:defRPr>
-            </a:lvl9pPr>
-          </a:lstStyle>
-          <a:p>
-            <a:r>
-              <a:rPr lang="en-US" sz="2800" b="0" dirty="0" err="1"/>
-              <a:t>isEven</a:t>
-            </a:r>
-            <a:r>
-              <a:rPr lang="en-US" sz="2800" b="0" dirty="0"/>
-              <a:t>(</a:t>
-            </a:r>
-            <a:r>
-              <a:rPr lang="en-US" sz="2800" b="0" i="1" dirty="0"/>
-              <a:t>x</a:t>
-            </a:r>
-            <a:r>
-              <a:rPr lang="en-US" sz="2800" b="0" dirty="0"/>
-              <a:t>) = </a:t>
-            </a:r>
-          </a:p>
-        </p:txBody>
-      </p:sp>
-      <p:sp>
-        <p:nvSpPr>
-          <p:cNvPr id="5" name="Left Brace 4"/>
-          <p:cNvSpPr/>
-          <p:nvPr/>
-        </p:nvSpPr>
-        <p:spPr>
-          <a:xfrm>
-            <a:off x="4572000" y="3124200"/>
-            <a:ext cx="304800" cy="838200"/>
-          </a:xfrm>
-          <a:prstGeom prst="leftBrace">
-            <a:avLst>
-              <a:gd name="adj1" fmla="val 19800"/>
-              <a:gd name="adj2" fmla="val 50000"/>
-            </a:avLst>
-          </a:prstGeom>
-          <a:noFill/>
-          <a:ln>
-            <a:solidFill>
-              <a:schemeClr val="tx1"/>
-            </a:solidFill>
-          </a:ln>
-          <a:effectLst/>
-        </p:spPr>
-        <p:style>
-          <a:lnRef idx="2">
-            <a:schemeClr val="accent1"/>
-          </a:lnRef>
-          <a:fillRef idx="0">
-            <a:schemeClr val="accent1"/>
-          </a:fillRef>
-          <a:effectRef idx="1">
-            <a:schemeClr val="accent1"/>
-          </a:effectRef>
-          <a:fontRef idx="minor">
-            <a:schemeClr val="tx1"/>
-          </a:fontRef>
-        </p:style>
-        <p:txBody>
-          <a:bodyPr anchor="ctr"/>
-          <a:lstStyle/>
-          <a:p>
-            <a:pPr algn="ctr">
-              <a:defRPr/>
-            </a:pPr>
-            <a:endParaRPr lang="en-US"/>
-          </a:p>
-        </p:txBody>
-      </p:sp>
-    </p:spTree>
-    <p:extLst>
-      <p:ext uri="{BB962C8B-B14F-4D97-AF65-F5344CB8AC3E}">
-        <p14:creationId xmlns:p14="http://schemas.microsoft.com/office/powerpoint/2010/main" val="4293239312"/>
-      </p:ext>
-    </p:extLst>
-  </p:cSld>
-  <p:clrMapOvr>
-    <a:masterClrMapping/>
-  </p:clrMapOvr>
-  <p:transition xmlns:p14="http://schemas.microsoft.com/office/powerpoint/2010/main" spd="med"/>
-  <p:timing>
-    <p:tnLst>
-      <p:par>
-        <p:cTn xmlns:p14="http://schemas.microsoft.com/office/powerpoint/2010/main" id="1" dur="indefinite" restart="never" nodeType="tmRoot">
-          <p:childTnLst>
-            <p:seq concurrent="1" nextAc="seek">
-              <p:cTn id="2" dur="indefinite" nodeType="mainSeq">
-                <p:childTnLst>
-                  <p:par>
-                    <p:cTn id="3" fill="hold" nodeType="clickPar">
-                      <p:stCondLst>
-                        <p:cond delay="indefinite"/>
-                        <p:cond evt="onBegin" delay="0">
-                          <p:tn val="2"/>
-                        </p:cond>
-                      </p:stCondLst>
-                      <p:childTnLst>
-                        <p:par>
-                          <p:cTn id="4" fill="hold" nodeType="withGroup">
-                            <p:stCondLst>
-                              <p:cond delay="0"/>
-                            </p:stCondLst>
-                            <p:childTnLst>
-                              <p:par>
-                                <p:cTn id="5" presetID="1" presetClass="entr" presetSubtype="0" fill="hold" grpId="0" nodeType="withEffect">
-                                  <p:stCondLst>
-                                    <p:cond delay="0"/>
-                                  </p:stCondLst>
-                                  <p:childTnLst>
-                                    <p:set>
-                                      <p:cBhvr>
-                                        <p:cTn id="6" dur="1" fill="hold">
-                                          <p:stCondLst>
-                                            <p:cond delay="0"/>
-                                          </p:stCondLst>
-                                        </p:cTn>
-                                        <p:tgtEl>
-                                          <p:spTgt spid="35843">
-                                            <p:txEl>
-                                              <p:pRg st="0" end="0"/>
-                                            </p:txEl>
-                                          </p:spTgt>
-                                        </p:tgtEl>
-                                        <p:attrNameLst>
-                                          <p:attrName>style.visibility</p:attrName>
-                                        </p:attrNameLst>
-                                      </p:cBhvr>
-                                      <p:to>
-                                        <p:strVal val="visible"/>
-                                      </p:to>
-                                    </p:set>
-                                  </p:childTnLst>
-                                </p:cTn>
-                              </p:par>
-                              <p:par>
-                                <p:cTn id="7" presetID="1" presetClass="entr" presetSubtype="0" fill="hold" grpId="0" nodeType="withEffect">
-                                  <p:stCondLst>
-                                    <p:cond delay="0"/>
-                                  </p:stCondLst>
-                                  <p:childTnLst>
-                                    <p:set>
-                                      <p:cBhvr>
-                                        <p:cTn id="8" dur="1" fill="hold">
-                                          <p:stCondLst>
-                                            <p:cond delay="0"/>
-                                          </p:stCondLst>
-                                        </p:cTn>
-                                        <p:tgtEl>
-                                          <p:spTgt spid="35843">
-                                            <p:txEl>
-                                              <p:pRg st="1" end="1"/>
-                                            </p:txEl>
-                                          </p:spTgt>
-                                        </p:tgtEl>
-                                        <p:attrNameLst>
-                                          <p:attrName>style.visibility</p:attrName>
-                                        </p:attrNameLst>
-                                      </p:cBhvr>
-                                      <p:to>
-                                        <p:strVal val="visible"/>
-                                      </p:to>
-                                    </p:set>
-                                  </p:childTnLst>
-                                </p:cTn>
-                              </p:par>
-                            </p:childTnLst>
-                          </p:cTn>
-                        </p:par>
-                      </p:childTnLst>
-                    </p:cTn>
-                  </p:par>
-                  <p:par>
-                    <p:cTn id="9" fill="hold" nodeType="clickPar">
-                      <p:stCondLst>
-                        <p:cond delay="indefinite"/>
-                      </p:stCondLst>
-                      <p:childTnLst>
-                        <p:par>
-                          <p:cTn id="10" fill="hold" nodeType="withGroup">
-                            <p:stCondLst>
-                              <p:cond delay="0"/>
-                            </p:stCondLst>
-                            <p:childTnLst>
-                              <p:par>
-                                <p:cTn id="11" presetID="1" presetClass="entr" presetSubtype="0" fill="hold" grpId="0" nodeType="clickEffect">
-                                  <p:stCondLst>
-                                    <p:cond delay="0"/>
-                                  </p:stCondLst>
-                                  <p:childTnLst>
-                                    <p:set>
-                                      <p:cBhvr>
-                                        <p:cTn id="12" dur="1" fill="hold">
-                                          <p:stCondLst>
-                                            <p:cond delay="0"/>
-                                          </p:stCondLst>
-                                        </p:cTn>
-                                        <p:tgtEl>
-                                          <p:spTgt spid="35843">
-                                            <p:txEl>
-                                              <p:pRg st="2" end="2"/>
-                                            </p:txEl>
-                                          </p:spTgt>
-                                        </p:tgtEl>
-                                        <p:attrNameLst>
-                                          <p:attrName>style.visibility</p:attrName>
-                                        </p:attrNameLst>
-                                      </p:cBhvr>
-                                      <p:to>
-                                        <p:strVal val="visible"/>
-                                      </p:to>
-                                    </p:set>
-                                  </p:childTnLst>
-                                </p:cTn>
-                              </p:par>
-                              <p:par>
-                                <p:cTn id="13" presetID="1" presetClass="entr" presetSubtype="0" fill="hold" grpId="0" nodeType="withEffect">
-                                  <p:stCondLst>
-                                    <p:cond delay="0"/>
-                                  </p:stCondLst>
-                                  <p:childTnLst>
-                                    <p:set>
-                                      <p:cBhvr>
-                                        <p:cTn id="14" dur="1" fill="hold">
-                                          <p:stCondLst>
-                                            <p:cond delay="0"/>
-                                          </p:stCondLst>
-                                        </p:cTn>
-                                        <p:tgtEl>
-                                          <p:spTgt spid="35846"/>
-                                        </p:tgtEl>
-                                        <p:attrNameLst>
-                                          <p:attrName>style.visibility</p:attrName>
-                                        </p:attrNameLst>
-                                      </p:cBhvr>
-                                      <p:to>
-                                        <p:strVal val="visible"/>
-                                      </p:to>
-                                    </p:set>
-                                  </p:childTnLst>
-                                </p:cTn>
-                              </p:par>
-                              <p:par>
-                                <p:cTn id="15" presetID="1" presetClass="entr" presetSubtype="0" fill="hold" grpId="0" nodeType="withEffect">
-                                  <p:stCondLst>
-                                    <p:cond delay="0"/>
-                                  </p:stCondLst>
-                                  <p:childTnLst>
-                                    <p:set>
-                                      <p:cBhvr>
-                                        <p:cTn id="16" dur="1" fill="hold">
-                                          <p:stCondLst>
-                                            <p:cond delay="0"/>
-                                          </p:stCondLst>
-                                        </p:cTn>
-                                        <p:tgtEl>
-                                          <p:spTgt spid="5"/>
-                                        </p:tgtEl>
-                                        <p:attrNameLst>
-                                          <p:attrName>style.visibility</p:attrName>
-                                        </p:attrNameLst>
-                                      </p:cBhvr>
-                                      <p:to>
-                                        <p:strVal val="visible"/>
-                                      </p:to>
-                                    </p:set>
-                                  </p:childTnLst>
-                                </p:cTn>
-                              </p:par>
-                            </p:childTnLst>
-                          </p:cTn>
-                        </p:par>
-                      </p:childTnLst>
-                    </p:cTn>
-                  </p:par>
-                  <p:par>
-                    <p:cTn id="17" fill="hold" nodeType="clickPar">
-                      <p:stCondLst>
-                        <p:cond delay="indefinite"/>
-                      </p:stCondLst>
-                      <p:childTnLst>
-                        <p:par>
-                          <p:cTn id="18" fill="hold" nodeType="withGroup">
-                            <p:stCondLst>
-                              <p:cond delay="0"/>
-                            </p:stCondLst>
-                            <p:childTnLst>
-                              <p:par>
-                                <p:cTn id="19" presetID="1" presetClass="entr" presetSubtype="0" fill="hold" grpId="0" nodeType="clickEffect">
-                                  <p:stCondLst>
-                                    <p:cond delay="0"/>
-                                  </p:stCondLst>
-                                  <p:childTnLst>
-                                    <p:set>
-                                      <p:cBhvr>
-                                        <p:cTn id="20" dur="1" fill="hold">
-                                          <p:stCondLst>
-                                            <p:cond delay="0"/>
-                                          </p:stCondLst>
-                                        </p:cTn>
-                                        <p:tgtEl>
-                                          <p:spTgt spid="35843">
-                                            <p:txEl>
-                                              <p:pRg st="3" end="3"/>
-                                            </p:txEl>
-                                          </p:spTgt>
-                                        </p:tgtEl>
-                                        <p:attrNameLst>
-                                          <p:attrName>style.visibility</p:attrName>
-                                        </p:attrNameLst>
-                                      </p:cBhvr>
-                                      <p:to>
-                                        <p:strVal val="visible"/>
-                                      </p:to>
-                                    </p:set>
-                                  </p:childTnLst>
-                                </p:cTn>
-                              </p:par>
-                              <p:par>
-                                <p:cTn id="21" presetID="1" presetClass="entr" presetSubtype="0" fill="hold" grpId="0" nodeType="withEffect">
-                                  <p:stCondLst>
-                                    <p:cond delay="0"/>
-                                  </p:stCondLst>
-                                  <p:childTnLst>
-                                    <p:set>
-                                      <p:cBhvr>
-                                        <p:cTn id="22" dur="1" fill="hold">
-                                          <p:stCondLst>
-                                            <p:cond delay="0"/>
-                                          </p:stCondLst>
-                                        </p:cTn>
-                                        <p:tgtEl>
-                                          <p:spTgt spid="35843">
-                                            <p:txEl>
-                                              <p:pRg st="4" end="4"/>
-                                            </p:txEl>
-                                          </p:spTgt>
-                                        </p:tgtEl>
-                                        <p:attrNameLst>
-                                          <p:attrName>style.visibility</p:attrName>
-                                        </p:attrNameLst>
-                                      </p:cBhvr>
-                                      <p:to>
-                                        <p:strVal val="visible"/>
-                                      </p:to>
-                                    </p:set>
-                                  </p:childTnLst>
-                                </p:cTn>
-                              </p:par>
-                              <p:par>
-                                <p:cTn id="23" presetID="1" presetClass="entr" presetSubtype="0" fill="hold" grpId="0" nodeType="withEffect">
-                                  <p:stCondLst>
-                                    <p:cond delay="0"/>
-                                  </p:stCondLst>
-                                  <p:childTnLst>
-                                    <p:set>
-                                      <p:cBhvr>
-                                        <p:cTn id="24" dur="1" fill="hold">
-                                          <p:stCondLst>
-                                            <p:cond delay="0"/>
-                                          </p:stCondLst>
-                                        </p:cTn>
-                                        <p:tgtEl>
-                                          <p:spTgt spid="35843">
-                                            <p:txEl>
-                                              <p:pRg st="5" end="5"/>
-                                            </p:txEl>
-                                          </p:spTgt>
-                                        </p:tgtEl>
-                                        <p:attrNameLst>
-                                          <p:attrName>style.visibility</p:attrName>
-                                        </p:attrNameLst>
-                                      </p:cBhvr>
-                                      <p:to>
-                                        <p:strVal val="visible"/>
-                                      </p:to>
-                                    </p:set>
-                                  </p:childTnLst>
-                                </p:cTn>
-                              </p:par>
-                              <p:par>
-                                <p:cTn id="25" presetID="1" presetClass="entr" presetSubtype="0" fill="hold" grpId="0" nodeType="withEffect">
-                                  <p:stCondLst>
-                                    <p:cond delay="0"/>
-                                  </p:stCondLst>
-                                  <p:childTnLst>
-                                    <p:set>
-                                      <p:cBhvr>
-                                        <p:cTn id="26" dur="1" fill="hold">
-                                          <p:stCondLst>
-                                            <p:cond delay="0"/>
-                                          </p:stCondLst>
-                                        </p:cTn>
-                                        <p:tgtEl>
-                                          <p:spTgt spid="35843">
-                                            <p:txEl>
-                                              <p:pRg st="6" end="6"/>
-                                            </p:txEl>
-                                          </p:spTgt>
-                                        </p:tgtEl>
-                                        <p:attrNameLst>
-                                          <p:attrName>style.visibility</p:attrName>
-                                        </p:attrNameLst>
-                                      </p:cBhvr>
-                                      <p:to>
-                                        <p:strVal val="visible"/>
-                                      </p:to>
-                                    </p:set>
-                                  </p:childTnLst>
-                                </p:cTn>
-                              </p:par>
-                            </p:childTnLst>
-                          </p:cTn>
-                        </p:par>
-                      </p:childTnLst>
-                    </p:cTn>
-                  </p:par>
-                </p:childTnLst>
-              </p:cTn>
-              <p:prevCondLst>
-                <p:cond evt="onPrev" delay="0">
-                  <p:tgtEl>
-                    <p:sldTgt/>
-                  </p:tgtEl>
-                </p:cond>
-              </p:prevCondLst>
-              <p:nextCondLst>
-                <p:cond evt="onNext" delay="0">
-                  <p:tgtEl>
-                    <p:sldTgt/>
-                  </p:tgtEl>
-                </p:cond>
-              </p:nextCondLst>
-            </p:seq>
-          </p:childTnLst>
-        </p:cTn>
-      </p:par>
-    </p:tnLst>
-    <p:bldLst>
-      <p:bldP spid="35843" grpId="0" build="p"/>
-      <p:bldP spid="35846" grpId="0"/>
-      <p:bldP spid="5" grpId="0" animBg="1"/>
     </p:bldLst>
   </p:timing>
 </p:sld>

</xml_diff>

<commit_message>
hw1 results module 4
</commit_message>
<xml_diff>
--- a/morea/materials/02-7BasicProgrammingConcepts.pptx
+++ b/morea/materials/02-7BasicProgrammingConcepts.pptx
@@ -211,7 +211,7 @@
           <a:p>
             <a:fld id="{BB6BAE91-212C-F34F-A74B-874A8C7A7F45}" type="datetimeFigureOut">
               <a:rPr lang="en-US" smtClean="0"/>
-              <a:t>1/28/15</a:t>
+              <a:t>2/1/15</a:t>
             </a:fld>
             <a:endParaRPr lang="en-US"/>
           </a:p>
@@ -1693,7 +1693,7 @@
           <a:p>
             <a:fld id="{95D0A52A-683A-E348-B00D-319C34B8C99A}" type="datetimeFigureOut">
               <a:rPr lang="en-US" smtClean="0"/>
-              <a:t>1/28/15</a:t>
+              <a:t>2/1/15</a:t>
             </a:fld>
             <a:endParaRPr lang="en-US"/>
           </a:p>
@@ -1863,7 +1863,7 @@
           <a:p>
             <a:fld id="{95D0A52A-683A-E348-B00D-319C34B8C99A}" type="datetimeFigureOut">
               <a:rPr lang="en-US" smtClean="0"/>
-              <a:t>1/28/15</a:t>
+              <a:t>2/1/15</a:t>
             </a:fld>
             <a:endParaRPr lang="en-US"/>
           </a:p>
@@ -2043,7 +2043,7 @@
           <a:p>
             <a:fld id="{95D0A52A-683A-E348-B00D-319C34B8C99A}" type="datetimeFigureOut">
               <a:rPr lang="en-US" smtClean="0"/>
-              <a:t>1/28/15</a:t>
+              <a:t>2/1/15</a:t>
             </a:fld>
             <a:endParaRPr lang="en-US"/>
           </a:p>
@@ -2213,7 +2213,7 @@
           <a:p>
             <a:fld id="{95D0A52A-683A-E348-B00D-319C34B8C99A}" type="datetimeFigureOut">
               <a:rPr lang="en-US" smtClean="0"/>
-              <a:t>1/28/15</a:t>
+              <a:t>2/1/15</a:t>
             </a:fld>
             <a:endParaRPr lang="en-US"/>
           </a:p>
@@ -2459,7 +2459,7 @@
           <a:p>
             <a:fld id="{95D0A52A-683A-E348-B00D-319C34B8C99A}" type="datetimeFigureOut">
               <a:rPr lang="en-US" smtClean="0"/>
-              <a:t>1/28/15</a:t>
+              <a:t>2/1/15</a:t>
             </a:fld>
             <a:endParaRPr lang="en-US"/>
           </a:p>
@@ -2747,7 +2747,7 @@
           <a:p>
             <a:fld id="{95D0A52A-683A-E348-B00D-319C34B8C99A}" type="datetimeFigureOut">
               <a:rPr lang="en-US" smtClean="0"/>
-              <a:t>1/28/15</a:t>
+              <a:t>2/1/15</a:t>
             </a:fld>
             <a:endParaRPr lang="en-US"/>
           </a:p>
@@ -3169,7 +3169,7 @@
           <a:p>
             <a:fld id="{95D0A52A-683A-E348-B00D-319C34B8C99A}" type="datetimeFigureOut">
               <a:rPr lang="en-US" smtClean="0"/>
-              <a:t>1/28/15</a:t>
+              <a:t>2/1/15</a:t>
             </a:fld>
             <a:endParaRPr lang="en-US"/>
           </a:p>
@@ -3287,7 +3287,7 @@
           <a:p>
             <a:fld id="{95D0A52A-683A-E348-B00D-319C34B8C99A}" type="datetimeFigureOut">
               <a:rPr lang="en-US" smtClean="0"/>
-              <a:t>1/28/15</a:t>
+              <a:t>2/1/15</a:t>
             </a:fld>
             <a:endParaRPr lang="en-US"/>
           </a:p>
@@ -3382,7 +3382,7 @@
           <a:p>
             <a:fld id="{95D0A52A-683A-E348-B00D-319C34B8C99A}" type="datetimeFigureOut">
               <a:rPr lang="en-US" smtClean="0"/>
-              <a:t>1/28/15</a:t>
+              <a:t>2/1/15</a:t>
             </a:fld>
             <a:endParaRPr lang="en-US"/>
           </a:p>
@@ -3659,7 +3659,7 @@
           <a:p>
             <a:fld id="{95D0A52A-683A-E348-B00D-319C34B8C99A}" type="datetimeFigureOut">
               <a:rPr lang="en-US" smtClean="0"/>
-              <a:t>1/28/15</a:t>
+              <a:t>2/1/15</a:t>
             </a:fld>
             <a:endParaRPr lang="en-US"/>
           </a:p>
@@ -3912,7 +3912,7 @@
           <a:p>
             <a:fld id="{95D0A52A-683A-E348-B00D-319C34B8C99A}" type="datetimeFigureOut">
               <a:rPr lang="en-US" smtClean="0"/>
-              <a:t>1/28/15</a:t>
+              <a:t>2/1/15</a:t>
             </a:fld>
             <a:endParaRPr lang="en-US"/>
           </a:p>
@@ -4021,10 +4021,10 @@
           <a:lstStyle/>
           <a:p>
             <a:r>
-              <a:rPr lang="en-US" smtClean="0"/>
+              <a:rPr lang="en-US" dirty="0" smtClean="0"/>
               <a:t>Click to edit Master title style</a:t>
             </a:r>
-            <a:endParaRPr lang="en-US"/>
+            <a:endParaRPr lang="en-US" dirty="0"/>
           </a:p>
         </p:txBody>
       </p:sp>
@@ -4125,7 +4125,7 @@
           <a:p>
             <a:fld id="{95D0A52A-683A-E348-B00D-319C34B8C99A}" type="datetimeFigureOut">
               <a:rPr lang="en-US" smtClean="0"/>
-              <a:t>1/28/15</a:t>
+              <a:t>2/1/15</a:t>
             </a:fld>
             <a:endParaRPr lang="en-US"/>
           </a:p>
@@ -4230,6 +4230,13 @@
     <p:sldLayoutId id="2147483658" r:id="rId10"/>
     <p:sldLayoutId id="2147483659" r:id="rId11"/>
   </p:sldLayoutIdLst>
+  <p:timing>
+    <p:tnLst>
+      <p:par>
+        <p:cTn xmlns:p14="http://schemas.microsoft.com/office/powerpoint/2010/main" id="1" dur="indefinite" restart="never" nodeType="tmRoot"/>
+      </p:par>
+    </p:tnLst>
+  </p:timing>
   <p:txStyles>
     <p:titleStyle>
       <a:lvl1pPr algn="ctr" defTabSz="457200" rtl="0" eaLnBrk="1" latinLnBrk="0" hangingPunct="1">
@@ -4570,19 +4577,11 @@
           <a:p>
             <a:r>
               <a:rPr lang="en-US" sz="2400" dirty="0" smtClean="0"/>
-              <a:t>Dr</a:t>
-            </a:r>
-            <a:r>
-              <a:rPr lang="en-US" sz="2400" dirty="0" smtClean="0"/>
-              <a:t>. </a:t>
+              <a:t>Dr. </a:t>
             </a:r>
             <a:r>
               <a:rPr lang="en-US" sz="2400" smtClean="0"/>
-              <a:t>Emily </a:t>
-            </a:r>
-            <a:r>
-              <a:rPr lang="en-US" sz="2400" smtClean="0"/>
-              <a:t>Hill</a:t>
+              <a:t>Emily Hill</a:t>
             </a:r>
             <a:endParaRPr lang="en-US" sz="2400" dirty="0" smtClean="0"/>
           </a:p>
@@ -9278,6 +9277,14 @@
             <a:r>
               <a:rPr lang="en-US" dirty="0" smtClean="0"/>
               <a:t>Math</a:t>
+            </a:r>
+            <a:r>
+              <a:rPr lang="en-US" dirty="0"/>
+              <a:t> </a:t>
+            </a:r>
+            <a:r>
+              <a:rPr lang="en-US" dirty="0" smtClean="0"/>
+              <a:t>&amp; Logic</a:t>
             </a:r>
             <a:br>
               <a:rPr lang="en-US" dirty="0" smtClean="0"/>

</xml_diff>